<commit_message>
Add sample_project, modify data.php for items'images and titles
</commit_message>
<xml_diff>
--- a/Build a simple website using PHP.pptx
+++ b/Build a simple website using PHP.pptx
@@ -5932,7 +5932,7 @@
           <a:p>
             <a:pPr algn="ctr"/>
             <a:r>
-              <a:rPr lang="en-US" sz="2400"/>
+              <a:rPr lang="en-US" sz="2000"/>
               <a:t>“They all start with the dollar-sign”</a:t>
             </a:r>
           </a:p>
@@ -6241,7 +6241,7 @@
         </p:nvSpPr>
         <p:spPr>
           <a:xfrm>
-            <a:off x="4366207" y="801997"/>
+            <a:off x="4576414" y="286990"/>
             <a:ext cx="5650151" cy="5073285"/>
           </a:xfrm>
           <a:prstGeom prst="rect">
@@ -6250,7 +6250,7 @@
         </p:spPr>
         <p:txBody>
           <a:bodyPr vert="horz" lIns="91440" tIns="45720" rIns="91440" bIns="45720" rtlCol="0" anchor="b">
-            <a:normAutofit fontScale="92500" lnSpcReduction="10000"/>
+            <a:normAutofit/>
           </a:bodyPr>
           <a:lstStyle>
             <a:lvl1pPr algn="l" defTabSz="914400" rtl="0" eaLnBrk="1" latinLnBrk="0" hangingPunct="1">
@@ -6278,7 +6278,7 @@
               </a:lnSpc>
             </a:pPr>
             <a:r>
-              <a:rPr lang="en-US" sz="8000">
+              <a:rPr lang="en-US" sz="5400">
                 <a:solidFill>
                   <a:schemeClr val="accent3">
                     <a:lumMod val="60000"/>
@@ -6290,7 +6290,7 @@
               <a:t>if</a:t>
             </a:r>
             <a:r>
-              <a:rPr lang="en-US" sz="8000">
+              <a:rPr lang="en-US" sz="5400">
                 <a:latin typeface="+mn-lt"/>
               </a:rPr>
               <a:t>() </a:t>
@@ -6303,7 +6303,7 @@
               </a:lnSpc>
             </a:pPr>
             <a:r>
-              <a:rPr lang="en-US" sz="8000">
+              <a:rPr lang="en-US" sz="5400">
                 <a:solidFill>
                   <a:schemeClr val="accent3">
                     <a:lumMod val="60000"/>
@@ -6315,7 +6315,7 @@
               <a:t>elseif</a:t>
             </a:r>
             <a:r>
-              <a:rPr lang="en-US" sz="8000">
+              <a:rPr lang="en-US" sz="5400">
                 <a:latin typeface="+mn-lt"/>
               </a:rPr>
               <a:t>() </a:t>
@@ -6328,7 +6328,7 @@
               </a:lnSpc>
             </a:pPr>
             <a:r>
-              <a:rPr lang="en-US" sz="8000">
+              <a:rPr lang="en-US" sz="5400">
                 <a:solidFill>
                   <a:schemeClr val="accent3">
                     <a:lumMod val="60000"/>
@@ -6339,7 +6339,7 @@
               </a:rPr>
               <a:t>else</a:t>
             </a:r>
-            <a:endParaRPr lang="en-US" sz="8000">
+            <a:endParaRPr lang="en-US" sz="5400">
               <a:latin typeface="+mn-lt"/>
             </a:endParaRPr>
           </a:p>
@@ -6491,12 +6491,14 @@
         </p:nvSpPr>
         <p:spPr/>
         <p:txBody>
-          <a:bodyPr/>
+          <a:bodyPr>
+            <a:normAutofit/>
+          </a:bodyPr>
           <a:lstStyle/>
           <a:p>
             <a:pPr algn="ctr"/>
             <a:r>
-              <a:rPr lang="en-US">
+              <a:rPr lang="en-US" sz="7200">
                 <a:solidFill>
                   <a:schemeClr val="accent3">
                     <a:lumMod val="60000"/>
@@ -6508,10 +6510,10 @@
               <a:t>isset</a:t>
             </a:r>
             <a:r>
-              <a:rPr lang="en-US"/>
+              <a:rPr lang="en-US" sz="7200"/>
               <a:t>( )</a:t>
             </a:r>
-            <a:endParaRPr lang="en-US">
+            <a:endParaRPr lang="en-US" sz="7200">
               <a:latin typeface="+mn-lt"/>
             </a:endParaRPr>
           </a:p>
@@ -6664,13 +6666,13 @@
         </p:spPr>
         <p:txBody>
           <a:bodyPr>
-            <a:normAutofit fontScale="90000"/>
+            <a:noAutofit/>
           </a:bodyPr>
           <a:lstStyle/>
           <a:p>
             <a:pPr marL="256032" lvl="1" algn="ctr"/>
             <a:r>
-              <a:rPr lang="en-US" sz="5400">
+              <a:rPr lang="en-US" sz="4400">
                 <a:solidFill>
                   <a:schemeClr val="accent1">
                     <a:lumMod val="50000"/>
@@ -6748,12 +6750,14 @@
         </p:nvSpPr>
         <p:spPr/>
         <p:txBody>
-          <a:bodyPr/>
+          <a:bodyPr>
+            <a:normAutofit/>
+          </a:bodyPr>
           <a:lstStyle/>
           <a:p>
             <a:pPr algn="ctr"/>
             <a:r>
-              <a:rPr lang="en-US">
+              <a:rPr lang="en-US" sz="7200">
                 <a:latin typeface="+mn-lt"/>
               </a:rPr>
               <a:t>Array</a:t>
@@ -6833,7 +6837,7 @@
           <a:p>
             <a:pPr algn="ctr"/>
             <a:r>
-              <a:rPr lang="en-US" sz="8000">
+              <a:rPr lang="en-US" sz="6000">
                 <a:latin typeface="+mn-lt"/>
               </a:rPr>
               <a:t>Associative Array</a:t>
@@ -7152,7 +7156,7 @@
           <a:p>
             <a:pPr algn="ctr"/>
             <a:r>
-              <a:rPr lang="en-US" sz="8000">
+              <a:rPr lang="en-US" sz="6600">
                 <a:latin typeface="+mn-lt"/>
               </a:rPr>
               <a:t>Loop</a:t>
@@ -7237,7 +7241,7 @@
           <a:p>
             <a:pPr algn="ctr"/>
             <a:r>
-              <a:rPr lang="en-US" sz="5400">
+              <a:rPr lang="en-US" sz="4800">
                 <a:solidFill>
                   <a:schemeClr val="accent3">
                     <a:lumMod val="60000"/>
@@ -7249,13 +7253,13 @@
               <a:t>for</a:t>
             </a:r>
             <a:r>
-              <a:rPr lang="en-US" sz="5400">
+              <a:rPr lang="en-US" sz="4800">
                 <a:latin typeface="+mn-lt"/>
               </a:rPr>
               <a:t>(</a:t>
             </a:r>
             <a:r>
-              <a:rPr lang="en-US" sz="5400">
+              <a:rPr lang="en-US" sz="4800">
                 <a:solidFill>
                   <a:schemeClr val="accent4">
                     <a:lumMod val="60000"/>
@@ -7267,13 +7271,13 @@
               <a:t>$i</a:t>
             </a:r>
             <a:r>
-              <a:rPr lang="en-US" sz="5400">
+              <a:rPr lang="en-US" sz="4800">
                 <a:latin typeface="+mn-lt"/>
               </a:rPr>
               <a:t> = </a:t>
             </a:r>
             <a:r>
-              <a:rPr lang="en-US" sz="5400">
+              <a:rPr lang="en-US" sz="4800">
                 <a:solidFill>
                   <a:srgbClr val="92D050"/>
                 </a:solidFill>
@@ -7282,13 +7286,13 @@
               <a:t>0</a:t>
             </a:r>
             <a:r>
-              <a:rPr lang="en-US" sz="5400">
+              <a:rPr lang="en-US" sz="4800">
                 <a:latin typeface="+mn-lt"/>
               </a:rPr>
               <a:t>; </a:t>
             </a:r>
             <a:r>
-              <a:rPr lang="en-US" sz="5400">
+              <a:rPr lang="en-US" sz="4800">
                 <a:solidFill>
                   <a:schemeClr val="accent4">
                     <a:lumMod val="60000"/>
@@ -7300,13 +7304,13 @@
               <a:t>$i</a:t>
             </a:r>
             <a:r>
-              <a:rPr lang="en-US" sz="5400">
+              <a:rPr lang="en-US" sz="4800">
                 <a:latin typeface="+mn-lt"/>
               </a:rPr>
               <a:t> &lt; </a:t>
             </a:r>
             <a:r>
-              <a:rPr lang="en-US" sz="5400">
+              <a:rPr lang="en-US" sz="4800">
                 <a:solidFill>
                   <a:schemeClr val="accent4">
                     <a:lumMod val="60000"/>
@@ -7318,13 +7322,13 @@
               <a:t>$n</a:t>
             </a:r>
             <a:r>
-              <a:rPr lang="en-US" sz="5400">
+              <a:rPr lang="en-US" sz="4800">
                 <a:latin typeface="+mn-lt"/>
               </a:rPr>
               <a:t>; </a:t>
             </a:r>
             <a:r>
-              <a:rPr lang="en-US" sz="5400">
+              <a:rPr lang="en-US" sz="4800">
                 <a:solidFill>
                   <a:schemeClr val="accent4">
                     <a:lumMod val="60000"/>
@@ -7336,7 +7340,7 @@
               <a:t>$i</a:t>
             </a:r>
             <a:r>
-              <a:rPr lang="en-US" sz="5400">
+              <a:rPr lang="en-US" sz="4800">
                 <a:latin typeface="+mn-lt"/>
               </a:rPr>
               <a:t>++)</a:t>
@@ -7497,7 +7501,7 @@
           <a:p>
             <a:pPr algn="ctr"/>
             <a:r>
-              <a:rPr lang="en-US" sz="8000">
+              <a:rPr lang="en-US" sz="6600">
                 <a:solidFill>
                   <a:schemeClr val="accent3">
                     <a:lumMod val="60000"/>
@@ -7509,7 +7513,7 @@
               <a:t>foreach</a:t>
             </a:r>
             <a:r>
-              <a:rPr lang="en-US" sz="8000">
+              <a:rPr lang="en-US" sz="6600">
                 <a:latin typeface="+mn-lt"/>
               </a:rPr>
               <a:t>()</a:t>
@@ -7663,12 +7667,14 @@
         </p:nvSpPr>
         <p:spPr/>
         <p:txBody>
-          <a:bodyPr/>
+          <a:bodyPr>
+            <a:normAutofit/>
+          </a:bodyPr>
           <a:lstStyle/>
           <a:p>
             <a:pPr algn="ctr"/>
             <a:r>
-              <a:rPr lang="en-US">
+              <a:rPr lang="en-US" sz="7200">
                 <a:latin typeface="+mn-lt"/>
               </a:rPr>
               <a:t>Concatination</a:t>
@@ -7699,12 +7705,14 @@
           </a:xfrm>
         </p:spPr>
         <p:txBody>
-          <a:bodyPr/>
+          <a:bodyPr>
+            <a:normAutofit/>
+          </a:bodyPr>
           <a:lstStyle/>
           <a:p>
             <a:pPr algn="ctr"/>
             <a:r>
-              <a:rPr lang="en-US"/>
+              <a:rPr lang="en-US" sz="2800"/>
               <a:t>“Use the dot”</a:t>
             </a:r>
           </a:p>
@@ -8700,7 +8708,7 @@
           <a:lstStyle/>
           <a:p>
             <a:r>
-              <a:rPr lang="en-US" sz="6000"/>
+              <a:rPr lang="en-US" sz="5400"/>
               <a:t>Learning by Coding</a:t>
             </a:r>
           </a:p>
@@ -10039,6 +10047,17 @@
 </file>
 
 <file path=customXml/item1.xml><?xml version="1.0" encoding="utf-8"?>
+<p:properties xmlns:p="http://schemas.microsoft.com/office/2006/metadata/properties" xmlns:xsi="http://www.w3.org/2001/XMLSchema-instance" xmlns:pc="http://schemas.microsoft.com/office/infopath/2007/PartnerControls">
+  <documentManagement>
+    <VSO_x0020_item_x0020_id xmlns="40262f94-9f35-4ac3-9a90-690165a166b7" xsi:nil="true"/>
+    <Assetid_x0020_ xmlns="40262f94-9f35-4ac3-9a90-690165a166b7" xsi:nil="true"/>
+    <Item_x0020_Details xmlns="40262f94-9f35-4ac3-9a90-690165a166b7" xsi:nil="true"/>
+    <Template_x0020_details xmlns="40262f94-9f35-4ac3-9a90-690165a166b7" xsi:nil="true"/>
+  </documentManagement>
+</p:properties>
+</file>
+
+<file path=customXml/item2.xml><?xml version="1.0" encoding="utf-8"?>
 <ct:contentTypeSchema xmlns:ct="http://schemas.microsoft.com/office/2006/metadata/contentType" xmlns:ma="http://schemas.microsoft.com/office/2006/metadata/properties/metaAttributes" ct:_="" ma:_="" ma:contentTypeName="Document" ma:contentTypeID="0x010100AA3F7D94069FF64A86F7DFF56D60E3BE" ma:contentTypeVersion="6" ma:contentTypeDescription="Create a new document." ma:contentTypeScope="" ma:versionID="c32302c77d4085ecf495bdddb7f5e889">
   <xsd:schema xmlns:xsd="http://www.w3.org/2001/XMLSchema" xmlns:xs="http://www.w3.org/2001/XMLSchema" xmlns:p="http://schemas.microsoft.com/office/2006/metadata/properties" xmlns:ns2="a4f35948-e619-41b3-aa29-22878b09cfd2" xmlns:ns3="40262f94-9f35-4ac3-9a90-690165a166b7" targetNamespace="http://schemas.microsoft.com/office/2006/metadata/properties" ma:root="true" ma:fieldsID="4ab5ae46be95f9d0be6107e8200be7a2" ns2:_="" ns3:_="">
     <xsd:import namespace="a4f35948-e619-41b3-aa29-22878b09cfd2"/>
@@ -10219,17 +10238,6 @@
 </ct:contentTypeSchema>
 </file>
 
-<file path=customXml/item2.xml><?xml version="1.0" encoding="utf-8"?>
-<p:properties xmlns:p="http://schemas.microsoft.com/office/2006/metadata/properties" xmlns:xsi="http://www.w3.org/2001/XMLSchema-instance" xmlns:pc="http://schemas.microsoft.com/office/infopath/2007/PartnerControls">
-  <documentManagement>
-    <VSO_x0020_item_x0020_id xmlns="40262f94-9f35-4ac3-9a90-690165a166b7" xsi:nil="true"/>
-    <Assetid_x0020_ xmlns="40262f94-9f35-4ac3-9a90-690165a166b7" xsi:nil="true"/>
-    <Item_x0020_Details xmlns="40262f94-9f35-4ac3-9a90-690165a166b7" xsi:nil="true"/>
-    <Template_x0020_details xmlns="40262f94-9f35-4ac3-9a90-690165a166b7" xsi:nil="true"/>
-  </documentManagement>
-</p:properties>
-</file>
-
 <file path=customXml/item3.xml><?xml version="1.0" encoding="utf-8"?>
 <?mso-contentType ?>
 <FormTemplates xmlns="http://schemas.microsoft.com/sharepoint/v3/contenttype/forms">
@@ -10240,6 +10248,23 @@
 </file>
 
 <file path=customXml/itemProps1.xml><?xml version="1.0" encoding="utf-8"?>
+<ds:datastoreItem xmlns:ds="http://schemas.openxmlformats.org/officeDocument/2006/customXml" ds:itemID="{5630C5B9-1E5F-4356-968E-2FC64955BFF3}">
+  <ds:schemaRefs>
+    <ds:schemaRef ds:uri="http://schemas.microsoft.com/office/2006/documentManagement/types"/>
+    <ds:schemaRef ds:uri="http://schemas.microsoft.com/office/2006/metadata/properties"/>
+    <ds:schemaRef ds:uri="http://purl.org/dc/elements/1.1/"/>
+    <ds:schemaRef ds:uri="http://www.w3.org/XML/1998/namespace"/>
+    <ds:schemaRef ds:uri="http://schemas.microsoft.com/office/infopath/2007/PartnerControls"/>
+    <ds:schemaRef ds:uri="http://purl.org/dc/dcmitype/"/>
+    <ds:schemaRef ds:uri="http://schemas.openxmlformats.org/package/2006/metadata/core-properties"/>
+    <ds:schemaRef ds:uri="40262f94-9f35-4ac3-9a90-690165a166b7"/>
+    <ds:schemaRef ds:uri="a4f35948-e619-41b3-aa29-22878b09cfd2"/>
+    <ds:schemaRef ds:uri="http://purl.org/dc/terms/"/>
+  </ds:schemaRefs>
+</ds:datastoreItem>
+</file>
+
+<file path=customXml/itemProps2.xml><?xml version="1.0" encoding="utf-8"?>
 <ds:datastoreItem xmlns:ds="http://schemas.openxmlformats.org/officeDocument/2006/customXml" ds:itemID="{8DD6EEDF-527A-4587-A446-F1DE3EAF9DA6}">
   <ds:schemaRefs>
     <ds:schemaRef ds:uri="http://schemas.microsoft.com/office/2006/metadata/contentType"/>
@@ -10258,23 +10283,6 @@
 </ds:datastoreItem>
 </file>
 
-<file path=customXml/itemProps2.xml><?xml version="1.0" encoding="utf-8"?>
-<ds:datastoreItem xmlns:ds="http://schemas.openxmlformats.org/officeDocument/2006/customXml" ds:itemID="{5630C5B9-1E5F-4356-968E-2FC64955BFF3}">
-  <ds:schemaRefs>
-    <ds:schemaRef ds:uri="http://schemas.microsoft.com/office/2006/documentManagement/types"/>
-    <ds:schemaRef ds:uri="http://schemas.microsoft.com/office/2006/metadata/properties"/>
-    <ds:schemaRef ds:uri="http://purl.org/dc/elements/1.1/"/>
-    <ds:schemaRef ds:uri="http://www.w3.org/XML/1998/namespace"/>
-    <ds:schemaRef ds:uri="http://schemas.microsoft.com/office/infopath/2007/PartnerControls"/>
-    <ds:schemaRef ds:uri="http://purl.org/dc/dcmitype/"/>
-    <ds:schemaRef ds:uri="http://schemas.openxmlformats.org/package/2006/metadata/core-properties"/>
-    <ds:schemaRef ds:uri="40262f94-9f35-4ac3-9a90-690165a166b7"/>
-    <ds:schemaRef ds:uri="a4f35948-e619-41b3-aa29-22878b09cfd2"/>
-    <ds:schemaRef ds:uri="http://purl.org/dc/terms/"/>
-  </ds:schemaRefs>
-</ds:datastoreItem>
-</file>
-
 <file path=customXml/itemProps3.xml><?xml version="1.0" encoding="utf-8"?>
 <ds:datastoreItem xmlns:ds="http://schemas.openxmlformats.org/officeDocument/2006/customXml" ds:itemID="{2E6DFB71-5650-4E53-8134-FCF33ECDD3D1}">
   <ds:schemaRefs>

</xml_diff>

<commit_message>
Update sample project and presentation
</commit_message>
<xml_diff>
--- a/Build a simple website using PHP.pptx
+++ b/Build a simple website using PHP.pptx
@@ -5,46 +5,47 @@
     <p:sldMasterId id="2147484026" r:id="rId4"/>
   </p:sldMasterIdLst>
   <p:notesMasterIdLst>
-    <p:notesMasterId r:id="rId39"/>
+    <p:notesMasterId r:id="rId40"/>
   </p:notesMasterIdLst>
   <p:handoutMasterIdLst>
-    <p:handoutMasterId r:id="rId40"/>
+    <p:handoutMasterId r:id="rId41"/>
   </p:handoutMasterIdLst>
   <p:sldIdLst>
     <p:sldId id="268" r:id="rId5"/>
-    <p:sldId id="269" r:id="rId6"/>
-    <p:sldId id="270" r:id="rId7"/>
-    <p:sldId id="273" r:id="rId8"/>
-    <p:sldId id="272" r:id="rId9"/>
-    <p:sldId id="274" r:id="rId10"/>
-    <p:sldId id="275" r:id="rId11"/>
-    <p:sldId id="276" r:id="rId12"/>
-    <p:sldId id="277" r:id="rId13"/>
-    <p:sldId id="278" r:id="rId14"/>
-    <p:sldId id="279" r:id="rId15"/>
-    <p:sldId id="283" r:id="rId16"/>
-    <p:sldId id="282" r:id="rId17"/>
-    <p:sldId id="284" r:id="rId18"/>
-    <p:sldId id="286" r:id="rId19"/>
-    <p:sldId id="285" r:id="rId20"/>
-    <p:sldId id="287" r:id="rId21"/>
-    <p:sldId id="288" r:id="rId22"/>
-    <p:sldId id="289" r:id="rId23"/>
-    <p:sldId id="291" r:id="rId24"/>
-    <p:sldId id="292" r:id="rId25"/>
-    <p:sldId id="290" r:id="rId26"/>
-    <p:sldId id="280" r:id="rId27"/>
-    <p:sldId id="293" r:id="rId28"/>
-    <p:sldId id="296" r:id="rId29"/>
-    <p:sldId id="298" r:id="rId30"/>
-    <p:sldId id="297" r:id="rId31"/>
-    <p:sldId id="302" r:id="rId32"/>
-    <p:sldId id="300" r:id="rId33"/>
-    <p:sldId id="301" r:id="rId34"/>
-    <p:sldId id="303" r:id="rId35"/>
-    <p:sldId id="304" r:id="rId36"/>
-    <p:sldId id="305" r:id="rId37"/>
-    <p:sldId id="306" r:id="rId38"/>
+    <p:sldId id="307" r:id="rId6"/>
+    <p:sldId id="269" r:id="rId7"/>
+    <p:sldId id="270" r:id="rId8"/>
+    <p:sldId id="273" r:id="rId9"/>
+    <p:sldId id="272" r:id="rId10"/>
+    <p:sldId id="274" r:id="rId11"/>
+    <p:sldId id="275" r:id="rId12"/>
+    <p:sldId id="276" r:id="rId13"/>
+    <p:sldId id="277" r:id="rId14"/>
+    <p:sldId id="278" r:id="rId15"/>
+    <p:sldId id="279" r:id="rId16"/>
+    <p:sldId id="283" r:id="rId17"/>
+    <p:sldId id="282" r:id="rId18"/>
+    <p:sldId id="284" r:id="rId19"/>
+    <p:sldId id="286" r:id="rId20"/>
+    <p:sldId id="285" r:id="rId21"/>
+    <p:sldId id="287" r:id="rId22"/>
+    <p:sldId id="288" r:id="rId23"/>
+    <p:sldId id="289" r:id="rId24"/>
+    <p:sldId id="291" r:id="rId25"/>
+    <p:sldId id="292" r:id="rId26"/>
+    <p:sldId id="290" r:id="rId27"/>
+    <p:sldId id="280" r:id="rId28"/>
+    <p:sldId id="293" r:id="rId29"/>
+    <p:sldId id="296" r:id="rId30"/>
+    <p:sldId id="298" r:id="rId31"/>
+    <p:sldId id="297" r:id="rId32"/>
+    <p:sldId id="302" r:id="rId33"/>
+    <p:sldId id="300" r:id="rId34"/>
+    <p:sldId id="301" r:id="rId35"/>
+    <p:sldId id="303" r:id="rId36"/>
+    <p:sldId id="304" r:id="rId37"/>
+    <p:sldId id="305" r:id="rId38"/>
+    <p:sldId id="306" r:id="rId39"/>
   </p:sldIdLst>
   <p:sldSz cx="12192000" cy="6858000"/>
   <p:notesSz cx="6858000" cy="9144000"/>
@@ -251,7 +252,7 @@
           <a:p>
             <a:fld id="{6AC4FB8F-ED15-48AB-97BD-17129D4E699D}" type="datetimeFigureOut">
               <a:rPr lang="en-US" smtClean="0"/>
-              <a:t>5/31/2017</a:t>
+              <a:t>6/10/2017</a:t>
             </a:fld>
             <a:endParaRPr lang="en-US"/>
           </a:p>
@@ -416,7 +417,7 @@
           <a:p>
             <a:fld id="{BBC9D437-CD83-4825-AD0D-5E7B341BC79B}" type="datetimeFigureOut">
               <a:rPr lang="en-US" smtClean="0"/>
-              <a:t>5/31/2017</a:t>
+              <a:t>6/10/2017</a:t>
             </a:fld>
             <a:endParaRPr lang="en-US"/>
           </a:p>
@@ -879,7 +880,7 @@
           <a:p>
             <a:fld id="{560CF8BB-EBC7-4B8F-9632-A5A136FBB880}" type="slidenum">
               <a:rPr lang="en-US" smtClean="0"/>
-              <a:t>4</a:t>
+              <a:t>5</a:t>
             </a:fld>
             <a:endParaRPr lang="en-US"/>
           </a:p>
@@ -967,7 +968,7 @@
           <a:p>
             <a:fld id="{560CF8BB-EBC7-4B8F-9632-A5A136FBB880}" type="slidenum">
               <a:rPr lang="en-US" smtClean="0"/>
-              <a:t>27</a:t>
+              <a:t>28</a:t>
             </a:fld>
             <a:endParaRPr lang="en-US"/>
           </a:p>
@@ -1283,7 +1284,7 @@
           <a:p>
             <a:fld id="{560CF8BB-EBC7-4B8F-9632-A5A136FBB880}" type="slidenum">
               <a:rPr lang="en-US" smtClean="0"/>
-              <a:t>5</a:t>
+              <a:t>6</a:t>
             </a:fld>
             <a:endParaRPr lang="en-US"/>
           </a:p>
@@ -1389,7 +1390,7 @@
           <a:p>
             <a:fld id="{560CF8BB-EBC7-4B8F-9632-A5A136FBB880}" type="slidenum">
               <a:rPr lang="en-US" smtClean="0"/>
-              <a:t>6</a:t>
+              <a:t>7</a:t>
             </a:fld>
             <a:endParaRPr lang="en-US"/>
           </a:p>
@@ -1477,7 +1478,7 @@
           <a:p>
             <a:fld id="{560CF8BB-EBC7-4B8F-9632-A5A136FBB880}" type="slidenum">
               <a:rPr lang="en-US" smtClean="0"/>
-              <a:t>8</a:t>
+              <a:t>9</a:t>
             </a:fld>
             <a:endParaRPr lang="en-US"/>
           </a:p>
@@ -1565,7 +1566,7 @@
           <a:p>
             <a:fld id="{560CF8BB-EBC7-4B8F-9632-A5A136FBB880}" type="slidenum">
               <a:rPr lang="en-US" smtClean="0"/>
-              <a:t>9</a:t>
+              <a:t>10</a:t>
             </a:fld>
             <a:endParaRPr lang="en-US"/>
           </a:p>
@@ -1666,7 +1667,7 @@
           <a:p>
             <a:fld id="{560CF8BB-EBC7-4B8F-9632-A5A136FBB880}" type="slidenum">
               <a:rPr lang="en-US" smtClean="0"/>
-              <a:t>11</a:t>
+              <a:t>12</a:t>
             </a:fld>
             <a:endParaRPr lang="en-US"/>
           </a:p>
@@ -1767,7 +1768,7 @@
           <a:p>
             <a:fld id="{560CF8BB-EBC7-4B8F-9632-A5A136FBB880}" type="slidenum">
               <a:rPr lang="en-US" smtClean="0"/>
-              <a:t>12</a:t>
+              <a:t>13</a:t>
             </a:fld>
             <a:endParaRPr lang="en-US"/>
           </a:p>
@@ -1855,7 +1856,7 @@
           <a:p>
             <a:fld id="{560CF8BB-EBC7-4B8F-9632-A5A136FBB880}" type="slidenum">
               <a:rPr lang="en-US" smtClean="0"/>
-              <a:t>17</a:t>
+              <a:t>18</a:t>
             </a:fld>
             <a:endParaRPr lang="en-US"/>
           </a:p>
@@ -1943,7 +1944,7 @@
           <a:p>
             <a:fld id="{560CF8BB-EBC7-4B8F-9632-A5A136FBB880}" type="slidenum">
               <a:rPr lang="en-US" smtClean="0"/>
-              <a:t>25</a:t>
+              <a:t>26</a:t>
             </a:fld>
             <a:endParaRPr lang="en-US"/>
           </a:p>
@@ -2109,7 +2110,7 @@
           <a:p>
             <a:fld id="{DD2465DD-9819-4ABC-A784-477AFBA19C86}" type="datetime1">
               <a:rPr lang="en-US" smtClean="0"/>
-              <a:t>5/31/2017</a:t>
+              <a:t>6/10/2017</a:t>
             </a:fld>
             <a:endParaRPr lang="en-US"/>
           </a:p>
@@ -2295,7 +2296,7 @@
           <a:p>
             <a:fld id="{0161E545-DA4D-4588-A168-A47EEF327FC2}" type="datetime1">
               <a:rPr lang="en-US" smtClean="0"/>
-              <a:t>5/31/2017</a:t>
+              <a:t>6/10/2017</a:t>
             </a:fld>
             <a:endParaRPr lang="en-US"/>
           </a:p>
@@ -2490,7 +2491,7 @@
           <a:p>
             <a:fld id="{8FB26042-7092-4D96-B3CE-E8E6CFEE88C8}" type="datetime1">
               <a:rPr lang="en-US" smtClean="0"/>
-              <a:t>5/31/2017</a:t>
+              <a:t>6/10/2017</a:t>
             </a:fld>
             <a:endParaRPr lang="en-US"/>
           </a:p>
@@ -2600,7 +2601,7 @@
           <a:p>
             <a:fld id="{B68C2989-19D5-42F7-8321-FE6B75231AF4}" type="datetime1">
               <a:rPr lang="en-US" smtClean="0"/>
-              <a:t>5/31/2017</a:t>
+              <a:t>6/10/2017</a:t>
             </a:fld>
             <a:endParaRPr lang="en-US"/>
           </a:p>
@@ -2785,7 +2786,7 @@
           <a:p>
             <a:fld id="{9729644A-97F2-4BC4-BBF7-FC141F507563}" type="datetime1">
               <a:rPr lang="en-US" smtClean="0"/>
-              <a:t>5/31/2017</a:t>
+              <a:t>6/10/2017</a:t>
             </a:fld>
             <a:endParaRPr lang="en-US"/>
           </a:p>
@@ -3057,7 +3058,7 @@
           <a:p>
             <a:fld id="{0F39F4F5-F4D2-4D2A-AB60-88D37ADCB869}" type="datetimeFigureOut">
               <a:rPr lang="en-US" smtClean="0"/>
-              <a:t>5/31/2017</a:t>
+              <a:t>6/10/2017</a:t>
             </a:fld>
             <a:endParaRPr lang="en-US"/>
           </a:p>
@@ -3357,7 +3358,7 @@
           <a:p>
             <a:fld id="{72104EB7-77EC-481E-BDC6-73CA182AC952}" type="datetime1">
               <a:rPr lang="en-US" smtClean="0"/>
-              <a:t>5/31/2017</a:t>
+              <a:t>6/10/2017</a:t>
             </a:fld>
             <a:endParaRPr lang="en-US"/>
           </a:p>
@@ -3801,7 +3802,7 @@
           <a:p>
             <a:fld id="{A0016069-A392-4E44-934F-6743D63E2A4F}" type="datetime1">
               <a:rPr lang="en-US" smtClean="0"/>
-              <a:t>5/31/2017</a:t>
+              <a:t>6/10/2017</a:t>
             </a:fld>
             <a:endParaRPr lang="en-US"/>
           </a:p>
@@ -3934,7 +3935,7 @@
           <a:p>
             <a:fld id="{781F9843-3551-47D6-BD3E-346FBDF458AF}" type="datetime1">
               <a:rPr lang="en-US" smtClean="0"/>
-              <a:t>5/31/2017</a:t>
+              <a:t>6/10/2017</a:t>
             </a:fld>
             <a:endParaRPr lang="en-US"/>
           </a:p>
@@ -4044,7 +4045,7 @@
           <a:p>
             <a:fld id="{B68C2989-19D5-42F7-8321-FE6B75231AF4}" type="datetime1">
               <a:rPr lang="en-US" smtClean="0"/>
-              <a:t>5/31/2017</a:t>
+              <a:t>6/10/2017</a:t>
             </a:fld>
             <a:endParaRPr lang="en-US"/>
           </a:p>
@@ -4415,7 +4416,7 @@
           <a:p>
             <a:fld id="{20F9C03C-1F27-412D-AD0B-6423348F1B9B}" type="datetime1">
               <a:rPr lang="en-US" smtClean="0"/>
-              <a:t>5/31/2017</a:t>
+              <a:t>6/10/2017</a:t>
             </a:fld>
             <a:endParaRPr lang="en-US"/>
           </a:p>
@@ -4724,7 +4725,7 @@
           <a:p>
             <a:fld id="{1471A834-4F3C-4AF9-9C74-05EC35A0F292}" type="datetimeFigureOut">
               <a:rPr lang="en-US" smtClean="0"/>
-              <a:t>5/31/2017</a:t>
+              <a:t>6/10/2017</a:t>
             </a:fld>
             <a:endParaRPr lang="en-US"/>
           </a:p>
@@ -5001,7 +5002,7 @@
           <a:p>
             <a:fld id="{619CFDC2-5630-4611-9BF0-0EF7C8C4398D}" type="datetime1">
               <a:rPr lang="en-US" smtClean="0"/>
-              <a:t>5/31/2017</a:t>
+              <a:t>6/10/2017</a:t>
             </a:fld>
             <a:endParaRPr lang="en-US"/>
           </a:p>
@@ -5492,7 +5493,7 @@
           <a:lstStyle/>
           <a:p>
             <a:r>
-              <a:rPr lang="en-US" sz="5400"/>
+              <a:rPr lang="en-US" sz="5400" dirty="0"/>
               <a:t>Build a Basic Website with PHP</a:t>
             </a:r>
           </a:p>
@@ -5510,13 +5511,31 @@
         </p:nvSpPr>
         <p:spPr/>
         <p:txBody>
-          <a:bodyPr/>
+          <a:bodyPr>
+            <a:normAutofit/>
+          </a:bodyPr>
           <a:lstStyle/>
           <a:p>
             <a:r>
-              <a:rPr lang="en-US"/>
-              <a:t>Subtitle</a:t>
-            </a:r>
+              <a:rPr lang="en-US" sz="2000" dirty="0">
+                <a:latin typeface="Calibri Light" panose="020F0302020204030204" pitchFamily="34" charset="0"/>
+                <a:cs typeface="Calibri Light" panose="020F0302020204030204" pitchFamily="34" charset="0"/>
+              </a:rPr>
+              <a:t>Speaker</a:t>
+            </a:r>
+          </a:p>
+          <a:p>
+            <a:r>
+              <a:rPr lang="en-US" sz="2000" dirty="0">
+                <a:latin typeface="Calibri" panose="020F0502020204030204" pitchFamily="34" charset="0"/>
+                <a:cs typeface="Calibri" panose="020F0502020204030204" pitchFamily="34" charset="0"/>
+              </a:rPr>
+              <a:t>Thai Ly Anh Khue</a:t>
+            </a:r>
+            <a:endParaRPr lang="en-US" sz="1800" dirty="0">
+              <a:latin typeface="Calibri" panose="020F0502020204030204" pitchFamily="34" charset="0"/>
+              <a:cs typeface="Calibri" panose="020F0502020204030204" pitchFamily="34" charset="0"/>
+            </a:endParaRPr>
           </a:p>
         </p:txBody>
       </p:sp>
@@ -5548,11 +5567,6 @@
 <file path=ppt/slides/slide10.xml><?xml version="1.0" encoding="utf-8"?>
 <p:sld xmlns:a="http://schemas.openxmlformats.org/drawingml/2006/main" xmlns:r="http://schemas.openxmlformats.org/officeDocument/2006/relationships" xmlns:p="http://schemas.openxmlformats.org/presentationml/2006/main">
   <p:cSld>
-    <p:bg>
-      <p:bgRef idx="1003">
-        <a:schemeClr val="bg2"/>
-      </p:bgRef>
-    </p:bg>
     <p:spTree>
       <p:nvGrpSpPr>
         <p:cNvPr id="1" name=""/>
@@ -5572,7 +5586,7 @@
           <p:cNvPr id="4" name="Title 3">
             <a:extLst>
               <a:ext uri="{FF2B5EF4-FFF2-40B4-BE49-F238E27FC236}">
-                <a16:creationId xmlns:a16="http://schemas.microsoft.com/office/drawing/2014/main" id="{3BE56E9B-4EEC-4A28-BE4A-3F0917934E7A}"/>
+                <a16:creationId xmlns:a16="http://schemas.microsoft.com/office/drawing/2014/main" id="{CE75FD60-5FC2-492F-92F9-9EFB3FC83826}"/>
               </a:ext>
             </a:extLst>
           </p:cNvPr>
@@ -5580,33 +5594,247 @@
             <a:spLocks noGrp="1"/>
           </p:cNvSpPr>
           <p:nvPr>
-            <p:ph type="ctrTitle"/>
+            <p:ph type="title"/>
           </p:nvPr>
         </p:nvSpPr>
         <p:spPr/>
         <p:txBody>
-          <a:bodyPr/>
+          <a:bodyPr>
+            <a:normAutofit/>
+          </a:bodyPr>
           <a:lstStyle/>
           <a:p>
-            <a:pPr algn="ctr"/>
-            <a:r>
-              <a:rPr lang="en-US" sz="7200">
-                <a:latin typeface="+mn-lt"/>
-              </a:rPr>
-              <a:t>&lt;?php ?&gt;</a:t>
-            </a:r>
+            <a:r>
+              <a:rPr lang="en-US">
+                <a:solidFill>
+                  <a:schemeClr val="accent1">
+                    <a:lumMod val="75000"/>
+                  </a:schemeClr>
+                </a:solidFill>
+              </a:rPr>
+              <a:t>Setting up the Project</a:t>
+            </a:r>
+          </a:p>
+        </p:txBody>
+      </p:sp>
+      <p:sp>
+        <p:nvSpPr>
+          <p:cNvPr id="5" name="Content Placeholder 4">
+            <a:extLst>
+              <a:ext uri="{FF2B5EF4-FFF2-40B4-BE49-F238E27FC236}">
+                <a16:creationId xmlns:a16="http://schemas.microsoft.com/office/drawing/2014/main" id="{AE9E38D3-9EDC-4176-9BF3-BB33CF66A8CC}"/>
+              </a:ext>
+            </a:extLst>
+          </p:cNvPr>
+          <p:cNvSpPr>
+            <a:spLocks noGrp="1"/>
+          </p:cNvSpPr>
+          <p:nvPr>
+            <p:ph idx="1"/>
+          </p:nvPr>
+        </p:nvSpPr>
+        <p:spPr/>
+        <p:txBody>
+          <a:bodyPr>
+            <a:normAutofit/>
+          </a:bodyPr>
+          <a:lstStyle/>
+          <a:p>
+            <a:pPr lvl="1">
+              <a:lnSpc>
+                <a:spcPct val="200000"/>
+              </a:lnSpc>
+              <a:spcBef>
+                <a:spcPts val="1200"/>
+              </a:spcBef>
+              <a:spcAft>
+                <a:spcPts val="600"/>
+              </a:spcAft>
+              <a:buFont typeface="Arial" panose="020B0604020202020204" pitchFamily="34" charset="0"/>
+              <a:buChar char="•"/>
+            </a:pPr>
+            <a:r>
+              <a:rPr lang="en-US">
+                <a:solidFill>
+                  <a:schemeClr val="accent1">
+                    <a:lumMod val="50000"/>
+                  </a:schemeClr>
+                </a:solidFill>
+              </a:rPr>
+              <a:t>Copy core files for the project</a:t>
+            </a:r>
+          </a:p>
+          <a:p>
+            <a:pPr lvl="1">
+              <a:lnSpc>
+                <a:spcPct val="200000"/>
+              </a:lnSpc>
+              <a:spcBef>
+                <a:spcPts val="1200"/>
+              </a:spcBef>
+              <a:spcAft>
+                <a:spcPts val="600"/>
+              </a:spcAft>
+              <a:buFont typeface="Arial" panose="020B0604020202020204" pitchFamily="34" charset="0"/>
+              <a:buChar char="•"/>
+            </a:pPr>
+            <a:r>
+              <a:rPr lang="en-US">
+                <a:solidFill>
+                  <a:schemeClr val="accent1">
+                    <a:lumMod val="50000"/>
+                  </a:schemeClr>
+                </a:solidFill>
+              </a:rPr>
+              <a:t>Deploy project on localhost</a:t>
+            </a:r>
+          </a:p>
+          <a:p>
+            <a:pPr lvl="1">
+              <a:lnSpc>
+                <a:spcPct val="200000"/>
+              </a:lnSpc>
+              <a:spcBef>
+                <a:spcPts val="1200"/>
+              </a:spcBef>
+              <a:spcAft>
+                <a:spcPts val="600"/>
+              </a:spcAft>
+              <a:buFont typeface="Arial" panose="020B0604020202020204" pitchFamily="34" charset="0"/>
+              <a:buChar char="•"/>
+            </a:pPr>
+            <a:r>
+              <a:rPr lang="en-US">
+                <a:solidFill>
+                  <a:schemeClr val="accent1">
+                    <a:lumMod val="50000"/>
+                  </a:schemeClr>
+                </a:solidFill>
+              </a:rPr>
+              <a:t>Open the project in PHPStorm</a:t>
+            </a:r>
+          </a:p>
+          <a:p>
+            <a:pPr lvl="1">
+              <a:lnSpc>
+                <a:spcPct val="200000"/>
+              </a:lnSpc>
+              <a:spcBef>
+                <a:spcPts val="1200"/>
+              </a:spcBef>
+              <a:spcAft>
+                <a:spcPts val="600"/>
+              </a:spcAft>
+              <a:buFont typeface="Arial" panose="020B0604020202020204" pitchFamily="34" charset="0"/>
+              <a:buChar char="•"/>
+            </a:pPr>
+            <a:endParaRPr lang="en-US">
+              <a:solidFill>
+                <a:schemeClr val="accent1">
+                  <a:lumMod val="50000"/>
+                </a:schemeClr>
+              </a:solidFill>
+            </a:endParaRPr>
+          </a:p>
+          <a:p>
+            <a:pPr lvl="1">
+              <a:lnSpc>
+                <a:spcPct val="200000"/>
+              </a:lnSpc>
+              <a:spcBef>
+                <a:spcPts val="1200"/>
+              </a:spcBef>
+              <a:spcAft>
+                <a:spcPts val="600"/>
+              </a:spcAft>
+              <a:buFont typeface="Arial" panose="020B0604020202020204" pitchFamily="34" charset="0"/>
+              <a:buChar char="•"/>
+            </a:pPr>
+            <a:endParaRPr lang="en-US">
+              <a:solidFill>
+                <a:schemeClr val="accent1">
+                  <a:lumMod val="50000"/>
+                </a:schemeClr>
+              </a:solidFill>
+            </a:endParaRPr>
+          </a:p>
+          <a:p>
+            <a:pPr lvl="1">
+              <a:lnSpc>
+                <a:spcPct val="200000"/>
+              </a:lnSpc>
+              <a:spcBef>
+                <a:spcPts val="1200"/>
+              </a:spcBef>
+              <a:spcAft>
+                <a:spcPts val="600"/>
+              </a:spcAft>
+              <a:buFont typeface="Arial" panose="020B0604020202020204" pitchFamily="34" charset="0"/>
+              <a:buChar char="•"/>
+            </a:pPr>
+            <a:endParaRPr lang="en-US">
+              <a:solidFill>
+                <a:schemeClr val="accent1">
+                  <a:lumMod val="50000"/>
+                </a:schemeClr>
+              </a:solidFill>
+            </a:endParaRPr>
+          </a:p>
+          <a:p>
+            <a:pPr lvl="1">
+              <a:lnSpc>
+                <a:spcPct val="200000"/>
+              </a:lnSpc>
+              <a:spcBef>
+                <a:spcPts val="1200"/>
+              </a:spcBef>
+              <a:spcAft>
+                <a:spcPts val="600"/>
+              </a:spcAft>
+              <a:buFont typeface="Arial" panose="020B0604020202020204" pitchFamily="34" charset="0"/>
+              <a:buChar char="•"/>
+            </a:pPr>
+            <a:endParaRPr lang="en-US">
+              <a:solidFill>
+                <a:schemeClr val="accent1">
+                  <a:lumMod val="50000"/>
+                </a:schemeClr>
+              </a:solidFill>
+            </a:endParaRPr>
+          </a:p>
+          <a:p>
+            <a:pPr lvl="1">
+              <a:lnSpc>
+                <a:spcPct val="200000"/>
+              </a:lnSpc>
+              <a:spcBef>
+                <a:spcPts val="1200"/>
+              </a:spcBef>
+              <a:spcAft>
+                <a:spcPts val="600"/>
+              </a:spcAft>
+              <a:buFont typeface="Arial" panose="020B0604020202020204" pitchFamily="34" charset="0"/>
+              <a:buChar char="•"/>
+            </a:pPr>
+            <a:endParaRPr lang="en-US">
+              <a:solidFill>
+                <a:schemeClr val="accent1">
+                  <a:lumMod val="50000"/>
+                </a:schemeClr>
+              </a:solidFill>
+            </a:endParaRPr>
           </a:p>
         </p:txBody>
       </p:sp>
     </p:spTree>
     <p:extLst>
       <p:ext uri="{BB962C8B-B14F-4D97-AF65-F5344CB8AC3E}">
-        <p14:creationId xmlns:p14="http://schemas.microsoft.com/office/powerpoint/2010/main" val="2184906408"/>
+        <p14:creationId xmlns:p14="http://schemas.microsoft.com/office/powerpoint/2010/main" val="1067580762"/>
       </p:ext>
     </p:extLst>
   </p:cSld>
   <p:clrMapOvr>
-    <a:overrideClrMapping bg1="dk1" tx1="lt1" bg2="dk2" tx2="lt2" accent1="accent1" accent2="accent2" accent3="accent3" accent4="accent4" accent5="accent5" accent6="accent6" hlink="hlink" folHlink="folHlink"/>
+    <a:masterClrMapping/>
   </p:clrMapOvr>
   <mc:AlternateContent xmlns:mc="http://schemas.openxmlformats.org/markup-compatibility/2006" xmlns:p14="http://schemas.microsoft.com/office/powerpoint/2010/main">
     <mc:Choice Requires="p14">
@@ -5620,87 +5848,6 @@
       </p:transition>
     </mc:Fallback>
   </mc:AlternateContent>
-  <p:timing>
-    <p:tnLst>
-      <p:par>
-        <p:cTn id="1" dur="indefinite" restart="never" nodeType="tmRoot">
-          <p:childTnLst>
-            <p:seq concurrent="1" nextAc="seek">
-              <p:cTn id="2" dur="indefinite" nodeType="mainSeq">
-                <p:childTnLst>
-                  <p:par>
-                    <p:cTn id="3" fill="hold">
-                      <p:stCondLst>
-                        <p:cond delay="indefinite"/>
-                      </p:stCondLst>
-                      <p:childTnLst>
-                        <p:par>
-                          <p:cTn id="4" fill="hold">
-                            <p:stCondLst>
-                              <p:cond delay="0"/>
-                            </p:stCondLst>
-                            <p:childTnLst>
-                              <p:par>
-                                <p:cTn id="5" presetID="1" presetClass="entr" presetSubtype="0" fill="hold" grpId="0" nodeType="clickEffect">
-                                  <p:stCondLst>
-                                    <p:cond delay="0"/>
-                                  </p:stCondLst>
-                                  <p:iterate type="lt">
-                                    <p:tmAbs val="100"/>
-                                  </p:iterate>
-                                  <p:childTnLst>
-                                    <p:set>
-                                      <p:cBhvr>
-                                        <p:cTn id="6" dur="1" fill="hold">
-                                          <p:stCondLst>
-                                            <p:cond delay="0"/>
-                                          </p:stCondLst>
-                                        </p:cTn>
-                                        <p:tgtEl>
-                                          <p:spTgt spid="4"/>
-                                        </p:tgtEl>
-                                        <p:attrNameLst>
-                                          <p:attrName>style.visibility</p:attrName>
-                                        </p:attrNameLst>
-                                      </p:cBhvr>
-                                      <p:to>
-                                        <p:strVal val="visible"/>
-                                      </p:to>
-                                    </p:set>
-                                  </p:childTnLst>
-                                </p:cTn>
-                              </p:par>
-                            </p:childTnLst>
-                          </p:cTn>
-                        </p:par>
-                      </p:childTnLst>
-                    </p:cTn>
-                  </p:par>
-                </p:childTnLst>
-              </p:cTn>
-              <p:prevCondLst>
-                <p:cond evt="onPrev" delay="0">
-                  <p:tgtEl>
-                    <p:sldTgt/>
-                  </p:tgtEl>
-                </p:cond>
-              </p:prevCondLst>
-              <p:nextCondLst>
-                <p:cond evt="onNext" delay="0">
-                  <p:tgtEl>
-                    <p:sldTgt/>
-                  </p:tgtEl>
-                </p:cond>
-              </p:nextCondLst>
-            </p:seq>
-          </p:childTnLst>
-        </p:cTn>
-      </p:par>
-    </p:tnLst>
-    <p:bldLst>
-      <p:bldP spid="4" grpId="0"/>
-    </p:bldLst>
-  </p:timing>
 </p:sld>
 </file>
 
@@ -5749,10 +5896,10 @@
           <a:p>
             <a:pPr algn="ctr"/>
             <a:r>
-              <a:rPr lang="en-US" sz="6600">
+              <a:rPr lang="en-US" sz="7200">
                 <a:latin typeface="+mn-lt"/>
               </a:rPr>
-              <a:t>echo / print</a:t>
+              <a:t>&lt;?php ?&gt;</a:t>
             </a:r>
           </a:p>
         </p:txBody>
@@ -5760,7 +5907,7 @@
     </p:spTree>
     <p:extLst>
       <p:ext uri="{BB962C8B-B14F-4D97-AF65-F5344CB8AC3E}">
-        <p14:creationId xmlns:p14="http://schemas.microsoft.com/office/powerpoint/2010/main" val="1388808480"/>
+        <p14:creationId xmlns:p14="http://schemas.microsoft.com/office/powerpoint/2010/main" val="2184906408"/>
       </p:ext>
     </p:extLst>
   </p:cSld>
@@ -5908,22 +6055,10 @@
           <a:p>
             <a:pPr algn="ctr"/>
             <a:r>
-              <a:rPr lang="en-US" sz="7200">
-                <a:solidFill>
-                  <a:schemeClr val="accent3">
-                    <a:lumMod val="60000"/>
-                    <a:lumOff val="40000"/>
-                  </a:schemeClr>
-                </a:solidFill>
+              <a:rPr lang="en-US" sz="6600">
                 <a:latin typeface="+mn-lt"/>
               </a:rPr>
-              <a:t>date</a:t>
-            </a:r>
-            <a:r>
-              <a:rPr lang="en-US" sz="7200">
-                <a:latin typeface="+mn-lt"/>
-              </a:rPr>
-              <a:t>()</a:t>
+              <a:t>echo / print</a:t>
             </a:r>
           </a:p>
         </p:txBody>
@@ -5931,7 +6066,7 @@
     </p:spTree>
     <p:extLst>
       <p:ext uri="{BB962C8B-B14F-4D97-AF65-F5344CB8AC3E}">
-        <p14:creationId xmlns:p14="http://schemas.microsoft.com/office/powerpoint/2010/main" val="3475597341"/>
+        <p14:creationId xmlns:p14="http://schemas.microsoft.com/office/powerpoint/2010/main" val="1388808480"/>
       </p:ext>
     </p:extLst>
   </p:cSld>
@@ -6069,58 +6204,32 @@
             <a:spLocks noGrp="1"/>
           </p:cNvSpPr>
           <p:nvPr>
-            <p:ph type="title"/>
+            <p:ph type="ctrTitle"/>
           </p:nvPr>
         </p:nvSpPr>
         <p:spPr/>
         <p:txBody>
-          <a:bodyPr>
-            <a:normAutofit/>
-          </a:bodyPr>
+          <a:bodyPr/>
           <a:lstStyle/>
           <a:p>
             <a:pPr algn="ctr"/>
             <a:r>
-              <a:rPr lang="en-US" sz="6600">
+              <a:rPr lang="en-US" sz="7200">
+                <a:solidFill>
+                  <a:schemeClr val="accent3">
+                    <a:lumMod val="60000"/>
+                    <a:lumOff val="40000"/>
+                  </a:schemeClr>
+                </a:solidFill>
                 <a:latin typeface="+mn-lt"/>
               </a:rPr>
-              <a:t>$_variables</a:t>
-            </a:r>
-          </a:p>
-        </p:txBody>
-      </p:sp>
-      <p:sp>
-        <p:nvSpPr>
-          <p:cNvPr id="2" name="Text Placeholder 1">
-            <a:extLst>
-              <a:ext uri="{FF2B5EF4-FFF2-40B4-BE49-F238E27FC236}">
-                <a16:creationId xmlns:a16="http://schemas.microsoft.com/office/drawing/2014/main" id="{AEDDB01B-C6AD-48EA-9601-DA98F591D0B2}"/>
-              </a:ext>
-            </a:extLst>
-          </p:cNvPr>
-          <p:cNvSpPr>
-            <a:spLocks noGrp="1"/>
-          </p:cNvSpPr>
-          <p:nvPr>
-            <p:ph type="body" idx="1"/>
-          </p:nvPr>
-        </p:nvSpPr>
-        <p:spPr>
-          <a:xfrm>
-            <a:off x="1380744" y="4123267"/>
-            <a:ext cx="9226296" cy="1645920"/>
-          </a:xfrm>
-        </p:spPr>
-        <p:txBody>
-          <a:bodyPr>
-            <a:normAutofit/>
-          </a:bodyPr>
-          <a:lstStyle/>
-          <a:p>
-            <a:pPr algn="ctr"/>
-            <a:r>
-              <a:rPr lang="en-US" sz="2000"/>
-              <a:t>“They all start with the dollar-sign”</a:t>
+              <a:t>date</a:t>
+            </a:r>
+            <a:r>
+              <a:rPr lang="en-US" sz="7200">
+                <a:latin typeface="+mn-lt"/>
+              </a:rPr>
+              <a:t>()</a:t>
             </a:r>
           </a:p>
         </p:txBody>
@@ -6128,7 +6237,7 @@
     </p:spTree>
     <p:extLst>
       <p:ext uri="{BB962C8B-B14F-4D97-AF65-F5344CB8AC3E}">
-        <p14:creationId xmlns:p14="http://schemas.microsoft.com/office/powerpoint/2010/main" val="4205842318"/>
+        <p14:creationId xmlns:p14="http://schemas.microsoft.com/office/powerpoint/2010/main" val="3475597341"/>
       </p:ext>
     </p:extLst>
   </p:cSld>
@@ -6271,15 +6380,53 @@
         </p:nvSpPr>
         <p:spPr/>
         <p:txBody>
-          <a:bodyPr/>
+          <a:bodyPr>
+            <a:normAutofit/>
+          </a:bodyPr>
           <a:lstStyle/>
           <a:p>
             <a:pPr algn="ctr"/>
             <a:r>
-              <a:rPr lang="en-US">
+              <a:rPr lang="en-US" sz="6600">
                 <a:latin typeface="+mn-lt"/>
               </a:rPr>
-              <a:t>$_GET</a:t>
+              <a:t>$_variables</a:t>
+            </a:r>
+          </a:p>
+        </p:txBody>
+      </p:sp>
+      <p:sp>
+        <p:nvSpPr>
+          <p:cNvPr id="2" name="Text Placeholder 1">
+            <a:extLst>
+              <a:ext uri="{FF2B5EF4-FFF2-40B4-BE49-F238E27FC236}">
+                <a16:creationId xmlns:a16="http://schemas.microsoft.com/office/drawing/2014/main" id="{AEDDB01B-C6AD-48EA-9601-DA98F591D0B2}"/>
+              </a:ext>
+            </a:extLst>
+          </p:cNvPr>
+          <p:cNvSpPr>
+            <a:spLocks noGrp="1"/>
+          </p:cNvSpPr>
+          <p:nvPr>
+            <p:ph type="body" idx="1"/>
+          </p:nvPr>
+        </p:nvSpPr>
+        <p:spPr>
+          <a:xfrm>
+            <a:off x="1380744" y="4123267"/>
+            <a:ext cx="9226296" cy="1645920"/>
+          </a:xfrm>
+        </p:spPr>
+        <p:txBody>
+          <a:bodyPr>
+            <a:normAutofit/>
+          </a:bodyPr>
+          <a:lstStyle/>
+          <a:p>
+            <a:pPr algn="ctr"/>
+            <a:r>
+              <a:rPr lang="en-US" sz="2000"/>
+              <a:t>“They all start with the dollar-sign”</a:t>
             </a:r>
           </a:p>
         </p:txBody>
@@ -6287,7 +6434,7 @@
     </p:spTree>
     <p:extLst>
       <p:ext uri="{BB962C8B-B14F-4D97-AF65-F5344CB8AC3E}">
-        <p14:creationId xmlns:p14="http://schemas.microsoft.com/office/powerpoint/2010/main" val="3770366697"/>
+        <p14:creationId xmlns:p14="http://schemas.microsoft.com/office/powerpoint/2010/main" val="4205842318"/>
       </p:ext>
     </p:extLst>
   </p:cSld>
@@ -6414,6 +6561,165 @@
       </p:grpSpPr>
       <p:sp>
         <p:nvSpPr>
+          <p:cNvPr id="4" name="Title 3">
+            <a:extLst>
+              <a:ext uri="{FF2B5EF4-FFF2-40B4-BE49-F238E27FC236}">
+                <a16:creationId xmlns:a16="http://schemas.microsoft.com/office/drawing/2014/main" id="{3BE56E9B-4EEC-4A28-BE4A-3F0917934E7A}"/>
+              </a:ext>
+            </a:extLst>
+          </p:cNvPr>
+          <p:cNvSpPr>
+            <a:spLocks noGrp="1"/>
+          </p:cNvSpPr>
+          <p:nvPr>
+            <p:ph type="title"/>
+          </p:nvPr>
+        </p:nvSpPr>
+        <p:spPr/>
+        <p:txBody>
+          <a:bodyPr/>
+          <a:lstStyle/>
+          <a:p>
+            <a:pPr algn="ctr"/>
+            <a:r>
+              <a:rPr lang="en-US">
+                <a:latin typeface="+mn-lt"/>
+              </a:rPr>
+              <a:t>$_GET</a:t>
+            </a:r>
+          </a:p>
+        </p:txBody>
+      </p:sp>
+    </p:spTree>
+    <p:extLst>
+      <p:ext uri="{BB962C8B-B14F-4D97-AF65-F5344CB8AC3E}">
+        <p14:creationId xmlns:p14="http://schemas.microsoft.com/office/powerpoint/2010/main" val="3770366697"/>
+      </p:ext>
+    </p:extLst>
+  </p:cSld>
+  <p:clrMapOvr>
+    <a:overrideClrMapping bg1="dk1" tx1="lt1" bg2="dk2" tx2="lt2" accent1="accent1" accent2="accent2" accent3="accent3" accent4="accent4" accent5="accent5" accent6="accent6" hlink="hlink" folHlink="folHlink"/>
+  </p:clrMapOvr>
+  <mc:AlternateContent xmlns:mc="http://schemas.openxmlformats.org/markup-compatibility/2006" xmlns:p14="http://schemas.microsoft.com/office/powerpoint/2010/main">
+    <mc:Choice Requires="p14">
+      <p:transition spd="med" p14:dur="700">
+        <p:fade/>
+      </p:transition>
+    </mc:Choice>
+    <mc:Fallback xmlns="">
+      <p:transition spd="med">
+        <p:fade/>
+      </p:transition>
+    </mc:Fallback>
+  </mc:AlternateContent>
+  <p:timing>
+    <p:tnLst>
+      <p:par>
+        <p:cTn id="1" dur="indefinite" restart="never" nodeType="tmRoot">
+          <p:childTnLst>
+            <p:seq concurrent="1" nextAc="seek">
+              <p:cTn id="2" dur="indefinite" nodeType="mainSeq">
+                <p:childTnLst>
+                  <p:par>
+                    <p:cTn id="3" fill="hold">
+                      <p:stCondLst>
+                        <p:cond delay="indefinite"/>
+                      </p:stCondLst>
+                      <p:childTnLst>
+                        <p:par>
+                          <p:cTn id="4" fill="hold">
+                            <p:stCondLst>
+                              <p:cond delay="0"/>
+                            </p:stCondLst>
+                            <p:childTnLst>
+                              <p:par>
+                                <p:cTn id="5" presetID="1" presetClass="entr" presetSubtype="0" fill="hold" grpId="0" nodeType="clickEffect">
+                                  <p:stCondLst>
+                                    <p:cond delay="0"/>
+                                  </p:stCondLst>
+                                  <p:iterate type="lt">
+                                    <p:tmAbs val="100"/>
+                                  </p:iterate>
+                                  <p:childTnLst>
+                                    <p:set>
+                                      <p:cBhvr>
+                                        <p:cTn id="6" dur="1" fill="hold">
+                                          <p:stCondLst>
+                                            <p:cond delay="0"/>
+                                          </p:stCondLst>
+                                        </p:cTn>
+                                        <p:tgtEl>
+                                          <p:spTgt spid="4"/>
+                                        </p:tgtEl>
+                                        <p:attrNameLst>
+                                          <p:attrName>style.visibility</p:attrName>
+                                        </p:attrNameLst>
+                                      </p:cBhvr>
+                                      <p:to>
+                                        <p:strVal val="visible"/>
+                                      </p:to>
+                                    </p:set>
+                                  </p:childTnLst>
+                                </p:cTn>
+                              </p:par>
+                            </p:childTnLst>
+                          </p:cTn>
+                        </p:par>
+                      </p:childTnLst>
+                    </p:cTn>
+                  </p:par>
+                </p:childTnLst>
+              </p:cTn>
+              <p:prevCondLst>
+                <p:cond evt="onPrev" delay="0">
+                  <p:tgtEl>
+                    <p:sldTgt/>
+                  </p:tgtEl>
+                </p:cond>
+              </p:prevCondLst>
+              <p:nextCondLst>
+                <p:cond evt="onNext" delay="0">
+                  <p:tgtEl>
+                    <p:sldTgt/>
+                  </p:tgtEl>
+                </p:cond>
+              </p:nextCondLst>
+            </p:seq>
+          </p:childTnLst>
+        </p:cTn>
+      </p:par>
+    </p:tnLst>
+    <p:bldLst>
+      <p:bldP spid="4" grpId="0"/>
+    </p:bldLst>
+  </p:timing>
+</p:sld>
+</file>
+
+<file path=ppt/slides/slide16.xml><?xml version="1.0" encoding="utf-8"?>
+<p:sld xmlns:a="http://schemas.openxmlformats.org/drawingml/2006/main" xmlns:r="http://schemas.openxmlformats.org/officeDocument/2006/relationships" xmlns:p="http://schemas.openxmlformats.org/presentationml/2006/main">
+  <p:cSld>
+    <p:bg>
+      <p:bgRef idx="1003">
+        <a:schemeClr val="bg2"/>
+      </p:bgRef>
+    </p:bg>
+    <p:spTree>
+      <p:nvGrpSpPr>
+        <p:cNvPr id="1" name=""/>
+        <p:cNvGrpSpPr/>
+        <p:nvPr/>
+      </p:nvGrpSpPr>
+      <p:grpSpPr>
+        <a:xfrm>
+          <a:off x="0" y="0"/>
+          <a:ext cx="0" cy="0"/>
+          <a:chOff x="0" y="0"/>
+          <a:chExt cx="0" cy="0"/>
+        </a:xfrm>
+      </p:grpSpPr>
+      <p:sp>
+        <p:nvSpPr>
           <p:cNvPr id="5" name="Title 3">
             <a:extLst>
               <a:ext uri="{FF2B5EF4-FFF2-40B4-BE49-F238E27FC236}">
@@ -6638,7 +6944,7 @@
 </p:sld>
 </file>
 
-<file path=ppt/slides/slide16.xml><?xml version="1.0" encoding="utf-8"?>
+<file path=ppt/slides/slide17.xml><?xml version="1.0" encoding="utf-8"?>
 <p:sld xmlns:a="http://schemas.openxmlformats.org/drawingml/2006/main" xmlns:r="http://schemas.openxmlformats.org/officeDocument/2006/relationships" xmlns:p="http://schemas.openxmlformats.org/presentationml/2006/main">
   <p:cSld>
     <p:bg>
@@ -6812,7 +7118,7 @@
 </p:sld>
 </file>
 
-<file path=ppt/slides/slide17.xml><?xml version="1.0" encoding="utf-8"?>
+<file path=ppt/slides/slide18.xml><?xml version="1.0" encoding="utf-8"?>
 <p:sld xmlns:a="http://schemas.openxmlformats.org/drawingml/2006/main" xmlns:r="http://schemas.openxmlformats.org/officeDocument/2006/relationships" xmlns:p="http://schemas.openxmlformats.org/presentationml/2006/main">
   <p:cSld>
     <p:spTree>
@@ -6881,86 +7187,6 @@
   </p:cSld>
   <p:clrMapOvr>
     <a:masterClrMapping/>
-  </p:clrMapOvr>
-  <mc:AlternateContent xmlns:mc="http://schemas.openxmlformats.org/markup-compatibility/2006" xmlns:p14="http://schemas.microsoft.com/office/powerpoint/2010/main">
-    <mc:Choice Requires="p14">
-      <p:transition spd="med" p14:dur="700">
-        <p:fade/>
-      </p:transition>
-    </mc:Choice>
-    <mc:Fallback xmlns="">
-      <p:transition spd="med">
-        <p:fade/>
-      </p:transition>
-    </mc:Fallback>
-  </mc:AlternateContent>
-</p:sld>
-</file>
-
-<file path=ppt/slides/slide18.xml><?xml version="1.0" encoding="utf-8"?>
-<p:sld xmlns:a="http://schemas.openxmlformats.org/drawingml/2006/main" xmlns:r="http://schemas.openxmlformats.org/officeDocument/2006/relationships" xmlns:p="http://schemas.openxmlformats.org/presentationml/2006/main">
-  <p:cSld>
-    <p:bg>
-      <p:bgRef idx="1003">
-        <a:schemeClr val="bg2"/>
-      </p:bgRef>
-    </p:bg>
-    <p:spTree>
-      <p:nvGrpSpPr>
-        <p:cNvPr id="1" name=""/>
-        <p:cNvGrpSpPr/>
-        <p:nvPr/>
-      </p:nvGrpSpPr>
-      <p:grpSpPr>
-        <a:xfrm>
-          <a:off x="0" y="0"/>
-          <a:ext cx="0" cy="0"/>
-          <a:chOff x="0" y="0"/>
-          <a:chExt cx="0" cy="0"/>
-        </a:xfrm>
-      </p:grpSpPr>
-      <p:sp>
-        <p:nvSpPr>
-          <p:cNvPr id="4" name="Title 3">
-            <a:extLst>
-              <a:ext uri="{FF2B5EF4-FFF2-40B4-BE49-F238E27FC236}">
-                <a16:creationId xmlns:a16="http://schemas.microsoft.com/office/drawing/2014/main" id="{3BE56E9B-4EEC-4A28-BE4A-3F0917934E7A}"/>
-              </a:ext>
-            </a:extLst>
-          </p:cNvPr>
-          <p:cNvSpPr>
-            <a:spLocks noGrp="1"/>
-          </p:cNvSpPr>
-          <p:nvPr>
-            <p:ph type="title"/>
-          </p:nvPr>
-        </p:nvSpPr>
-        <p:spPr/>
-        <p:txBody>
-          <a:bodyPr>
-            <a:normAutofit/>
-          </a:bodyPr>
-          <a:lstStyle/>
-          <a:p>
-            <a:pPr algn="ctr"/>
-            <a:r>
-              <a:rPr lang="en-US" sz="7200">
-                <a:latin typeface="+mn-lt"/>
-              </a:rPr>
-              <a:t>Array</a:t>
-            </a:r>
-          </a:p>
-        </p:txBody>
-      </p:sp>
-    </p:spTree>
-    <p:extLst>
-      <p:ext uri="{BB962C8B-B14F-4D97-AF65-F5344CB8AC3E}">
-        <p14:creationId xmlns:p14="http://schemas.microsoft.com/office/powerpoint/2010/main" val="3697283682"/>
-      </p:ext>
-    </p:extLst>
-  </p:cSld>
-  <p:clrMapOvr>
-    <a:overrideClrMapping bg1="dk1" tx1="lt1" bg2="dk2" tx2="lt2" accent1="accent1" accent2="accent2" accent3="accent3" accent4="accent4" accent5="accent5" accent6="accent6" hlink="hlink" folHlink="folHlink"/>
   </p:clrMapOvr>
   <mc:AlternateContent xmlns:mc="http://schemas.openxmlformats.org/markup-compatibility/2006" xmlns:p14="http://schemas.microsoft.com/office/powerpoint/2010/main">
     <mc:Choice Requires="p14">
@@ -7024,10 +7250,10 @@
           <a:p>
             <a:pPr algn="ctr"/>
             <a:r>
-              <a:rPr lang="en-US" sz="6000">
+              <a:rPr lang="en-US" sz="7200">
                 <a:latin typeface="+mn-lt"/>
               </a:rPr>
-              <a:t>Associative Array</a:t>
+              <a:t>Array</a:t>
             </a:r>
           </a:p>
         </p:txBody>
@@ -7035,7 +7261,7 @@
     </p:spTree>
     <p:extLst>
       <p:ext uri="{BB962C8B-B14F-4D97-AF65-F5344CB8AC3E}">
-        <p14:creationId xmlns:p14="http://schemas.microsoft.com/office/powerpoint/2010/main" val="856657042"/>
+        <p14:creationId xmlns:p14="http://schemas.microsoft.com/office/powerpoint/2010/main" val="3697283682"/>
       </p:ext>
     </p:extLst>
   </p:cSld>
@@ -7084,27 +7310,76 @@
             <p:ph type="title"/>
           </p:nvPr>
         </p:nvSpPr>
-        <p:spPr/>
-        <p:txBody>
-          <a:bodyPr/>
+        <p:spPr>
+          <a:xfrm>
+            <a:off x="676656" y="353482"/>
+            <a:ext cx="10772775" cy="1658198"/>
+          </a:xfrm>
+        </p:spPr>
+        <p:txBody>
+          <a:bodyPr>
+            <a:normAutofit/>
+          </a:bodyPr>
           <a:lstStyle/>
           <a:p>
             <a:r>
-              <a:rPr lang="en-US">
+              <a:rPr lang="en-US" sz="4400" dirty="0">
                 <a:solidFill>
                   <a:schemeClr val="accent1">
                     <a:lumMod val="75000"/>
                   </a:schemeClr>
                 </a:solidFill>
               </a:rPr>
-              <a:t>Agenda	</a:t>
-            </a:r>
-          </a:p>
-        </p:txBody>
-      </p:sp>
-      <p:sp>
-        <p:nvSpPr>
-          <p:cNvPr id="3" name="Content Placeholder 2"/>
+              <a:t>About me</a:t>
+            </a:r>
+          </a:p>
+        </p:txBody>
+      </p:sp>
+      <p:pic>
+        <p:nvPicPr>
+          <p:cNvPr id="5" name="Picture 4">
+            <a:extLst>
+              <a:ext uri="{FF2B5EF4-FFF2-40B4-BE49-F238E27FC236}">
+                <a16:creationId xmlns:a16="http://schemas.microsoft.com/office/drawing/2014/main" id="{9880AE14-7332-4C58-B600-9FBDAD135C8C}"/>
+              </a:ext>
+            </a:extLst>
+          </p:cNvPr>
+          <p:cNvPicPr>
+            <a:picLocks noChangeAspect="1"/>
+          </p:cNvPicPr>
+          <p:nvPr/>
+        </p:nvPicPr>
+        <p:blipFill>
+          <a:blip r:embed="rId2">
+            <a:extLst>
+              <a:ext uri="{28A0092B-C50C-407E-A947-70E740481C1C}">
+                <a14:useLocalDpi xmlns:a14="http://schemas.microsoft.com/office/drawing/2010/main" val="0"/>
+              </a:ext>
+            </a:extLst>
+          </a:blip>
+          <a:stretch>
+            <a:fillRect/>
+          </a:stretch>
+        </p:blipFill>
+        <p:spPr>
+          <a:xfrm>
+            <a:off x="1370339" y="2200866"/>
+            <a:ext cx="1338064" cy="2147232"/>
+          </a:xfrm>
+          <a:prstGeom prst="rect">
+            <a:avLst/>
+          </a:prstGeom>
+        </p:spPr>
+      </p:pic>
+      <p:sp>
+        <p:nvSpPr>
+          <p:cNvPr id="6" name="Content Placeholder 2">
+            <a:extLst>
+              <a:ext uri="{FF2B5EF4-FFF2-40B4-BE49-F238E27FC236}">
+                <a16:creationId xmlns:a16="http://schemas.microsoft.com/office/drawing/2014/main" id="{99BC1583-575A-4D33-9EE0-5B49FD4EE02E}"/>
+              </a:ext>
+            </a:extLst>
+          </p:cNvPr>
           <p:cNvSpPr>
             <a:spLocks noGrp="1"/>
           </p:cNvSpPr>
@@ -7112,143 +7387,129 @@
             <p:ph idx="1"/>
           </p:nvPr>
         </p:nvSpPr>
-        <p:spPr/>
+        <p:spPr>
+          <a:xfrm>
+            <a:off x="3668439" y="2011680"/>
+            <a:ext cx="8523561" cy="3766185"/>
+          </a:xfrm>
+        </p:spPr>
         <p:txBody>
           <a:bodyPr/>
           <a:lstStyle/>
           <a:p>
-            <a:pPr marL="457200" indent="-457200">
-              <a:buFont typeface="+mj-lt"/>
-              <a:buAutoNum type="arabicPeriod"/>
+            <a:pPr marL="256032" lvl="1" indent="0">
+              <a:lnSpc>
+                <a:spcPct val="150000"/>
+              </a:lnSpc>
+              <a:buNone/>
             </a:pPr>
             <a:r>
-              <a:rPr lang="en-US">
+              <a:rPr lang="en-US" dirty="0">
                 <a:solidFill>
                   <a:schemeClr val="accent1">
                     <a:lumMod val="50000"/>
                   </a:schemeClr>
                 </a:solidFill>
               </a:rPr>
-              <a:t>PHP Overview</a:t>
-            </a:r>
-          </a:p>
-          <a:p>
-            <a:pPr marL="457200" indent="-457200">
-              <a:buFont typeface="+mj-lt"/>
-              <a:buAutoNum type="arabicPeriod"/>
+              <a:t>THAI LY ANH KHUE</a:t>
+            </a:r>
+          </a:p>
+          <a:p>
+            <a:pPr marL="541782" lvl="1" indent="-285750">
+              <a:lnSpc>
+                <a:spcPct val="150000"/>
+              </a:lnSpc>
+              <a:buFontTx/>
+              <a:buChar char="-"/>
             </a:pPr>
             <a:r>
-              <a:rPr lang="en-US">
+              <a:rPr lang="en-US" sz="1800" dirty="0"/>
+              <a:t>Sophomore of Software Engineering at FPT University</a:t>
+            </a:r>
+          </a:p>
+          <a:p>
+            <a:pPr marL="541782" lvl="1" indent="-285750">
+              <a:lnSpc>
+                <a:spcPct val="150000"/>
+              </a:lnSpc>
+              <a:buFontTx/>
+              <a:buChar char="-"/>
+            </a:pPr>
+            <a:r>
+              <a:rPr lang="en-US" sz="1800" dirty="0"/>
+              <a:t>Developer at Query Co., Ltd</a:t>
+            </a:r>
+          </a:p>
+          <a:p>
+            <a:pPr marL="541782" lvl="1" indent="-285750">
+              <a:lnSpc>
+                <a:spcPct val="150000"/>
+              </a:lnSpc>
+              <a:buFontTx/>
+              <a:buChar char="-"/>
+            </a:pPr>
+            <a:r>
+              <a:rPr lang="en-US" sz="1800" dirty="0"/>
+              <a:t>BMAGER  </a:t>
+            </a:r>
+          </a:p>
+          <a:p>
+            <a:pPr marL="541782" lvl="1" indent="-285750">
+              <a:lnSpc>
+                <a:spcPct val="150000"/>
+              </a:lnSpc>
+              <a:buFontTx/>
+              <a:buChar char="-"/>
+            </a:pPr>
+            <a:r>
+              <a:rPr lang="en-US" sz="1800" dirty="0">
                 <a:solidFill>
                   <a:schemeClr val="accent1">
                     <a:lumMod val="50000"/>
                   </a:schemeClr>
                 </a:solidFill>
               </a:rPr>
-              <a:t>Learning by Coding</a:t>
-            </a:r>
-          </a:p>
-          <a:p>
-            <a:pPr marL="713232" lvl="1" indent="-457200">
-              <a:buFont typeface="Arial" panose="020B0604020202020204" pitchFamily="34" charset="0"/>
-              <a:buChar char="•"/>
+              <a:t>Languages: Vietnamese, English</a:t>
+            </a:r>
+          </a:p>
+          <a:p>
+            <a:pPr marL="541782" lvl="1" indent="-285750">
+              <a:lnSpc>
+                <a:spcPct val="150000"/>
+              </a:lnSpc>
+              <a:buFontTx/>
+              <a:buChar char="-"/>
             </a:pPr>
             <a:r>
-              <a:rPr lang="en-US">
+              <a:rPr lang="en-US" sz="1800" dirty="0">
                 <a:solidFill>
                   <a:schemeClr val="accent1">
                     <a:lumMod val="50000"/>
                   </a:schemeClr>
                 </a:solidFill>
               </a:rPr>
-              <a:t>Configuring PHP development environment</a:t>
-            </a:r>
-          </a:p>
-          <a:p>
-            <a:pPr marL="713232" lvl="1" indent="-457200">
-              <a:buFont typeface="Arial" panose="020B0604020202020204" pitchFamily="34" charset="0"/>
-              <a:buChar char="•"/>
+              <a:t>Programming Languages: C, Java, PHP</a:t>
+            </a:r>
+          </a:p>
+          <a:p>
+            <a:pPr marL="541782" lvl="1" indent="-285750">
+              <a:lnSpc>
+                <a:spcPct val="150000"/>
+              </a:lnSpc>
+              <a:buFontTx/>
+              <a:buChar char="-"/>
             </a:pPr>
             <a:r>
-              <a:rPr lang="en-US">
+              <a:rPr lang="en-US" sz="1800" dirty="0">
                 <a:solidFill>
                   <a:schemeClr val="accent1">
                     <a:lumMod val="50000"/>
                   </a:schemeClr>
                 </a:solidFill>
               </a:rPr>
-              <a:t>Setting up the Project</a:t>
-            </a:r>
-          </a:p>
-          <a:p>
-            <a:pPr marL="713232" lvl="1" indent="-457200">
-              <a:buFont typeface="Arial" panose="020B0604020202020204" pitchFamily="34" charset="0"/>
-              <a:buChar char="•"/>
-            </a:pPr>
-            <a:r>
-              <a:rPr lang="en-US">
-                <a:solidFill>
-                  <a:schemeClr val="accent1">
-                    <a:lumMod val="50000"/>
-                  </a:schemeClr>
-                </a:solidFill>
-              </a:rPr>
-              <a:t>Listing and Sorting Inventory Items</a:t>
-            </a:r>
-          </a:p>
-          <a:p>
-            <a:pPr marL="713232" lvl="1" indent="-457200">
-              <a:buFont typeface="Arial" panose="020B0604020202020204" pitchFamily="34" charset="0"/>
-              <a:buChar char="•"/>
-            </a:pPr>
-            <a:r>
-              <a:rPr lang="en-US">
-                <a:solidFill>
-                  <a:schemeClr val="accent1">
-                    <a:lumMod val="50000"/>
-                  </a:schemeClr>
-                </a:solidFill>
-              </a:rPr>
-              <a:t>Adding a Basic Form</a:t>
-            </a:r>
-          </a:p>
-          <a:p>
-            <a:pPr marL="713232" lvl="1" indent="-457200">
-              <a:buFont typeface="Arial" panose="020B0604020202020204" pitchFamily="34" charset="0"/>
-              <a:buChar char="•"/>
-            </a:pPr>
-            <a:r>
-              <a:rPr lang="en-US">
-                <a:solidFill>
-                  <a:schemeClr val="accent1">
-                    <a:lumMod val="50000"/>
-                  </a:schemeClr>
-                </a:solidFill>
-              </a:rPr>
-              <a:t>Enhancing a Form</a:t>
-            </a:r>
-          </a:p>
-          <a:p>
-            <a:pPr marL="0" indent="0">
-              <a:buNone/>
-            </a:pPr>
-            <a:r>
-              <a:rPr lang="en-US">
-                <a:solidFill>
-                  <a:schemeClr val="accent1">
-                    <a:lumMod val="50000"/>
-                  </a:schemeClr>
-                </a:solidFill>
-              </a:rPr>
-              <a:t>3. Review </a:t>
-            </a:r>
-          </a:p>
-          <a:p>
-            <a:pPr marL="713232" lvl="1" indent="-457200">
-              <a:buFont typeface="+mj-lt"/>
-              <a:buAutoNum type="arabicPeriod"/>
-            </a:pPr>
-            <a:endParaRPr lang="en-US">
+              <a:t>Email: khuetla@querygroup.vn</a:t>
+            </a:r>
+            <a:endParaRPr lang="en-US" dirty="0">
               <a:solidFill>
                 <a:schemeClr val="accent1">
                   <a:lumMod val="50000"/>
@@ -7256,25 +7517,12 @@
               </a:solidFill>
             </a:endParaRPr>
           </a:p>
-          <a:p>
-            <a:pPr marL="713232" lvl="1" indent="-457200">
-              <a:buFont typeface="+mj-lt"/>
-              <a:buAutoNum type="arabicPeriod"/>
-            </a:pPr>
-            <a:endParaRPr lang="en-US">
-              <a:solidFill>
-                <a:schemeClr val="accent1">
-                  <a:lumMod val="50000"/>
-                </a:schemeClr>
-              </a:solidFill>
-            </a:endParaRPr>
-          </a:p>
         </p:txBody>
       </p:sp>
     </p:spTree>
     <p:extLst>
       <p:ext uri="{BB962C8B-B14F-4D97-AF65-F5344CB8AC3E}">
-        <p14:creationId xmlns:p14="http://schemas.microsoft.com/office/powerpoint/2010/main" val="2523332612"/>
+        <p14:creationId xmlns:p14="http://schemas.microsoft.com/office/powerpoint/2010/main" val="1606199075"/>
       </p:ext>
     </p:extLst>
   </p:cSld>
@@ -7343,10 +7591,10 @@
           <a:p>
             <a:pPr algn="ctr"/>
             <a:r>
-              <a:rPr lang="en-US" sz="6600">
+              <a:rPr lang="en-US" sz="6000">
                 <a:latin typeface="+mn-lt"/>
               </a:rPr>
-              <a:t>Loop</a:t>
+              <a:t>Associative Array</a:t>
             </a:r>
           </a:p>
         </p:txBody>
@@ -7354,7 +7602,7 @@
     </p:spTree>
     <p:extLst>
       <p:ext uri="{BB962C8B-B14F-4D97-AF65-F5344CB8AC3E}">
-        <p14:creationId xmlns:p14="http://schemas.microsoft.com/office/powerpoint/2010/main" val="2343473044"/>
+        <p14:creationId xmlns:p14="http://schemas.microsoft.com/office/powerpoint/2010/main" val="856657042"/>
       </p:ext>
     </p:extLst>
   </p:cSld>
@@ -7414,12 +7662,7 @@
             <p:ph type="title"/>
           </p:nvPr>
         </p:nvSpPr>
-        <p:spPr>
-          <a:xfrm>
-            <a:off x="645545" y="578233"/>
-            <a:ext cx="10780776" cy="3355848"/>
-          </a:xfrm>
-        </p:spPr>
+        <p:spPr/>
         <p:txBody>
           <a:bodyPr>
             <a:normAutofit/>
@@ -7428,109 +7671,10 @@
           <a:p>
             <a:pPr algn="ctr"/>
             <a:r>
-              <a:rPr lang="en-US" sz="4800">
-                <a:solidFill>
-                  <a:schemeClr val="accent3">
-                    <a:lumMod val="60000"/>
-                    <a:lumOff val="40000"/>
-                  </a:schemeClr>
-                </a:solidFill>
+              <a:rPr lang="en-US" sz="6600">
                 <a:latin typeface="+mn-lt"/>
               </a:rPr>
-              <a:t>for</a:t>
-            </a:r>
-            <a:r>
-              <a:rPr lang="en-US" sz="4800">
-                <a:latin typeface="+mn-lt"/>
-              </a:rPr>
-              <a:t>(</a:t>
-            </a:r>
-            <a:r>
-              <a:rPr lang="en-US" sz="4800">
-                <a:solidFill>
-                  <a:schemeClr val="accent4">
-                    <a:lumMod val="60000"/>
-                    <a:lumOff val="40000"/>
-                  </a:schemeClr>
-                </a:solidFill>
-                <a:latin typeface="+mn-lt"/>
-              </a:rPr>
-              <a:t>$i</a:t>
-            </a:r>
-            <a:r>
-              <a:rPr lang="en-US" sz="4800">
-                <a:latin typeface="+mn-lt"/>
-              </a:rPr>
-              <a:t> = </a:t>
-            </a:r>
-            <a:r>
-              <a:rPr lang="en-US" sz="4800">
-                <a:solidFill>
-                  <a:srgbClr val="92D050"/>
-                </a:solidFill>
-                <a:latin typeface="+mn-lt"/>
-              </a:rPr>
-              <a:t>0</a:t>
-            </a:r>
-            <a:r>
-              <a:rPr lang="en-US" sz="4800">
-                <a:latin typeface="+mn-lt"/>
-              </a:rPr>
-              <a:t>; </a:t>
-            </a:r>
-            <a:r>
-              <a:rPr lang="en-US" sz="4800">
-                <a:solidFill>
-                  <a:schemeClr val="accent4">
-                    <a:lumMod val="60000"/>
-                    <a:lumOff val="40000"/>
-                  </a:schemeClr>
-                </a:solidFill>
-                <a:latin typeface="+mn-lt"/>
-              </a:rPr>
-              <a:t>$i</a:t>
-            </a:r>
-            <a:r>
-              <a:rPr lang="en-US" sz="4800">
-                <a:latin typeface="+mn-lt"/>
-              </a:rPr>
-              <a:t> &lt; </a:t>
-            </a:r>
-            <a:r>
-              <a:rPr lang="en-US" sz="4800">
-                <a:solidFill>
-                  <a:schemeClr val="accent4">
-                    <a:lumMod val="60000"/>
-                    <a:lumOff val="40000"/>
-                  </a:schemeClr>
-                </a:solidFill>
-                <a:latin typeface="+mn-lt"/>
-              </a:rPr>
-              <a:t>$n</a:t>
-            </a:r>
-            <a:r>
-              <a:rPr lang="en-US" sz="4800">
-                <a:latin typeface="+mn-lt"/>
-              </a:rPr>
-              <a:t>; </a:t>
-            </a:r>
-            <a:r>
-              <a:rPr lang="en-US" sz="4800">
-                <a:solidFill>
-                  <a:schemeClr val="accent4">
-                    <a:lumMod val="60000"/>
-                    <a:lumOff val="40000"/>
-                  </a:schemeClr>
-                </a:solidFill>
-                <a:latin typeface="+mn-lt"/>
-              </a:rPr>
-              <a:t>$i</a:t>
-            </a:r>
-            <a:r>
-              <a:rPr lang="en-US" sz="4800">
-                <a:latin typeface="+mn-lt"/>
-              </a:rPr>
-              <a:t>++)</a:t>
+              <a:t>Loop</a:t>
             </a:r>
           </a:p>
         </p:txBody>
@@ -7538,7 +7682,7 @@
     </p:spTree>
     <p:extLst>
       <p:ext uri="{BB962C8B-B14F-4D97-AF65-F5344CB8AC3E}">
-        <p14:creationId xmlns:p14="http://schemas.microsoft.com/office/powerpoint/2010/main" val="57509690"/>
+        <p14:creationId xmlns:p14="http://schemas.microsoft.com/office/powerpoint/2010/main" val="2343473044"/>
       </p:ext>
     </p:extLst>
   </p:cSld>
@@ -7557,87 +7701,6 @@
       </p:transition>
     </mc:Fallback>
   </mc:AlternateContent>
-  <p:timing>
-    <p:tnLst>
-      <p:par>
-        <p:cTn id="1" dur="indefinite" restart="never" nodeType="tmRoot">
-          <p:childTnLst>
-            <p:seq concurrent="1" nextAc="seek">
-              <p:cTn id="2" dur="indefinite" nodeType="mainSeq">
-                <p:childTnLst>
-                  <p:par>
-                    <p:cTn id="3" fill="hold">
-                      <p:stCondLst>
-                        <p:cond delay="indefinite"/>
-                      </p:stCondLst>
-                      <p:childTnLst>
-                        <p:par>
-                          <p:cTn id="4" fill="hold">
-                            <p:stCondLst>
-                              <p:cond delay="0"/>
-                            </p:stCondLst>
-                            <p:childTnLst>
-                              <p:par>
-                                <p:cTn id="5" presetID="1" presetClass="entr" presetSubtype="0" fill="hold" grpId="0" nodeType="clickEffect">
-                                  <p:stCondLst>
-                                    <p:cond delay="0"/>
-                                  </p:stCondLst>
-                                  <p:iterate type="lt">
-                                    <p:tmAbs val="100"/>
-                                  </p:iterate>
-                                  <p:childTnLst>
-                                    <p:set>
-                                      <p:cBhvr>
-                                        <p:cTn id="6" dur="1" fill="hold">
-                                          <p:stCondLst>
-                                            <p:cond delay="0"/>
-                                          </p:stCondLst>
-                                        </p:cTn>
-                                        <p:tgtEl>
-                                          <p:spTgt spid="4"/>
-                                        </p:tgtEl>
-                                        <p:attrNameLst>
-                                          <p:attrName>style.visibility</p:attrName>
-                                        </p:attrNameLst>
-                                      </p:cBhvr>
-                                      <p:to>
-                                        <p:strVal val="visible"/>
-                                      </p:to>
-                                    </p:set>
-                                  </p:childTnLst>
-                                </p:cTn>
-                              </p:par>
-                            </p:childTnLst>
-                          </p:cTn>
-                        </p:par>
-                      </p:childTnLst>
-                    </p:cTn>
-                  </p:par>
-                </p:childTnLst>
-              </p:cTn>
-              <p:prevCondLst>
-                <p:cond evt="onPrev" delay="0">
-                  <p:tgtEl>
-                    <p:sldTgt/>
-                  </p:tgtEl>
-                </p:cond>
-              </p:prevCondLst>
-              <p:nextCondLst>
-                <p:cond evt="onNext" delay="0">
-                  <p:tgtEl>
-                    <p:sldTgt/>
-                  </p:tgtEl>
-                </p:cond>
-              </p:nextCondLst>
-            </p:seq>
-          </p:childTnLst>
-        </p:cTn>
-      </p:par>
-    </p:tnLst>
-    <p:bldLst>
-      <p:bldP spid="4" grpId="0"/>
-    </p:bldLst>
-  </p:timing>
 </p:sld>
 </file>
 
@@ -7679,7 +7742,12 @@
             <p:ph type="title"/>
           </p:nvPr>
         </p:nvSpPr>
-        <p:spPr/>
+        <p:spPr>
+          <a:xfrm>
+            <a:off x="645545" y="578233"/>
+            <a:ext cx="10780776" cy="3355848"/>
+          </a:xfrm>
+        </p:spPr>
         <p:txBody>
           <a:bodyPr>
             <a:normAutofit/>
@@ -7688,7 +7756,7 @@
           <a:p>
             <a:pPr algn="ctr"/>
             <a:r>
-              <a:rPr lang="en-US" sz="5400">
+              <a:rPr lang="en-US" sz="4800">
                 <a:solidFill>
                   <a:schemeClr val="accent3">
                     <a:lumMod val="60000"/>
@@ -7697,16 +7765,16 @@
                 </a:solidFill>
                 <a:latin typeface="+mn-lt"/>
               </a:rPr>
-              <a:t>foreach</a:t>
-            </a:r>
-            <a:r>
-              <a:rPr lang="en-US" sz="5400">
+              <a:t>for</a:t>
+            </a:r>
+            <a:r>
+              <a:rPr lang="en-US" sz="4800">
                 <a:latin typeface="+mn-lt"/>
               </a:rPr>
               <a:t>(</a:t>
             </a:r>
             <a:r>
-              <a:rPr lang="en-US" sz="5400">
+              <a:rPr lang="en-US" sz="4800">
                 <a:solidFill>
                   <a:schemeClr val="accent4">
                     <a:lumMod val="60000"/>
@@ -7715,16 +7783,31 @@
                 </a:solidFill>
                 <a:latin typeface="+mn-lt"/>
               </a:rPr>
-              <a:t>$array </a:t>
-            </a:r>
-            <a:r>
-              <a:rPr lang="en-US" sz="5400">
+              <a:t>$i</a:t>
+            </a:r>
+            <a:r>
+              <a:rPr lang="en-US" sz="4800">
                 <a:latin typeface="+mn-lt"/>
               </a:rPr>
-              <a:t>as </a:t>
-            </a:r>
-            <a:r>
-              <a:rPr lang="en-US" sz="5400">
+              <a:t> = </a:t>
+            </a:r>
+            <a:r>
+              <a:rPr lang="en-US" sz="4800">
+                <a:solidFill>
+                  <a:srgbClr val="92D050"/>
+                </a:solidFill>
+                <a:latin typeface="+mn-lt"/>
+              </a:rPr>
+              <a:t>0</a:t>
+            </a:r>
+            <a:r>
+              <a:rPr lang="en-US" sz="4800">
+                <a:latin typeface="+mn-lt"/>
+              </a:rPr>
+              <a:t>; </a:t>
+            </a:r>
+            <a:r>
+              <a:rPr lang="en-US" sz="4800">
                 <a:solidFill>
                   <a:schemeClr val="accent4">
                     <a:lumMod val="60000"/>
@@ -7733,13 +7816,49 @@
                 </a:solidFill>
                 <a:latin typeface="+mn-lt"/>
               </a:rPr>
-              <a:t>$item</a:t>
-            </a:r>
-            <a:r>
-              <a:rPr lang="en-US" sz="5400">
+              <a:t>$i</a:t>
+            </a:r>
+            <a:r>
+              <a:rPr lang="en-US" sz="4800">
                 <a:latin typeface="+mn-lt"/>
               </a:rPr>
-              <a:t>)</a:t>
+              <a:t> &lt; </a:t>
+            </a:r>
+            <a:r>
+              <a:rPr lang="en-US" sz="4800">
+                <a:solidFill>
+                  <a:schemeClr val="accent4">
+                    <a:lumMod val="60000"/>
+                    <a:lumOff val="40000"/>
+                  </a:schemeClr>
+                </a:solidFill>
+                <a:latin typeface="+mn-lt"/>
+              </a:rPr>
+              <a:t>$n</a:t>
+            </a:r>
+            <a:r>
+              <a:rPr lang="en-US" sz="4800">
+                <a:latin typeface="+mn-lt"/>
+              </a:rPr>
+              <a:t>; </a:t>
+            </a:r>
+            <a:r>
+              <a:rPr lang="en-US" sz="4800">
+                <a:solidFill>
+                  <a:schemeClr val="accent4">
+                    <a:lumMod val="60000"/>
+                    <a:lumOff val="40000"/>
+                  </a:schemeClr>
+                </a:solidFill>
+                <a:latin typeface="+mn-lt"/>
+              </a:rPr>
+              <a:t>$i</a:t>
+            </a:r>
+            <a:r>
+              <a:rPr lang="en-US" sz="4800">
+                <a:latin typeface="+mn-lt"/>
+              </a:rPr>
+              <a:t>++)</a:t>
             </a:r>
           </a:p>
         </p:txBody>
@@ -7747,7 +7866,7 @@
     </p:spTree>
     <p:extLst>
       <p:ext uri="{BB962C8B-B14F-4D97-AF65-F5344CB8AC3E}">
-        <p14:creationId xmlns:p14="http://schemas.microsoft.com/office/powerpoint/2010/main" val="630764824"/>
+        <p14:creationId xmlns:p14="http://schemas.microsoft.com/office/powerpoint/2010/main" val="57509690"/>
       </p:ext>
     </p:extLst>
   </p:cSld>
@@ -7897,6 +8016,215 @@
           <a:p>
             <a:pPr algn="ctr"/>
             <a:r>
+              <a:rPr lang="en-US" sz="5400">
+                <a:solidFill>
+                  <a:schemeClr val="accent3">
+                    <a:lumMod val="60000"/>
+                    <a:lumOff val="40000"/>
+                  </a:schemeClr>
+                </a:solidFill>
+                <a:latin typeface="+mn-lt"/>
+              </a:rPr>
+              <a:t>foreach</a:t>
+            </a:r>
+            <a:r>
+              <a:rPr lang="en-US" sz="5400">
+                <a:latin typeface="+mn-lt"/>
+              </a:rPr>
+              <a:t>(</a:t>
+            </a:r>
+            <a:r>
+              <a:rPr lang="en-US" sz="5400">
+                <a:solidFill>
+                  <a:schemeClr val="accent4">
+                    <a:lumMod val="60000"/>
+                    <a:lumOff val="40000"/>
+                  </a:schemeClr>
+                </a:solidFill>
+                <a:latin typeface="+mn-lt"/>
+              </a:rPr>
+              <a:t>$array </a:t>
+            </a:r>
+            <a:r>
+              <a:rPr lang="en-US" sz="5400">
+                <a:latin typeface="+mn-lt"/>
+              </a:rPr>
+              <a:t>as </a:t>
+            </a:r>
+            <a:r>
+              <a:rPr lang="en-US" sz="5400">
+                <a:solidFill>
+                  <a:schemeClr val="accent4">
+                    <a:lumMod val="60000"/>
+                    <a:lumOff val="40000"/>
+                  </a:schemeClr>
+                </a:solidFill>
+                <a:latin typeface="+mn-lt"/>
+              </a:rPr>
+              <a:t>$item</a:t>
+            </a:r>
+            <a:r>
+              <a:rPr lang="en-US" sz="5400">
+                <a:latin typeface="+mn-lt"/>
+              </a:rPr>
+              <a:t>)</a:t>
+            </a:r>
+          </a:p>
+        </p:txBody>
+      </p:sp>
+    </p:spTree>
+    <p:extLst>
+      <p:ext uri="{BB962C8B-B14F-4D97-AF65-F5344CB8AC3E}">
+        <p14:creationId xmlns:p14="http://schemas.microsoft.com/office/powerpoint/2010/main" val="630764824"/>
+      </p:ext>
+    </p:extLst>
+  </p:cSld>
+  <p:clrMapOvr>
+    <a:overrideClrMapping bg1="dk1" tx1="lt1" bg2="dk2" tx2="lt2" accent1="accent1" accent2="accent2" accent3="accent3" accent4="accent4" accent5="accent5" accent6="accent6" hlink="hlink" folHlink="folHlink"/>
+  </p:clrMapOvr>
+  <mc:AlternateContent xmlns:mc="http://schemas.openxmlformats.org/markup-compatibility/2006" xmlns:p14="http://schemas.microsoft.com/office/powerpoint/2010/main">
+    <mc:Choice Requires="p14">
+      <p:transition spd="med" p14:dur="700">
+        <p:fade/>
+      </p:transition>
+    </mc:Choice>
+    <mc:Fallback xmlns="">
+      <p:transition spd="med">
+        <p:fade/>
+      </p:transition>
+    </mc:Fallback>
+  </mc:AlternateContent>
+  <p:timing>
+    <p:tnLst>
+      <p:par>
+        <p:cTn id="1" dur="indefinite" restart="never" nodeType="tmRoot">
+          <p:childTnLst>
+            <p:seq concurrent="1" nextAc="seek">
+              <p:cTn id="2" dur="indefinite" nodeType="mainSeq">
+                <p:childTnLst>
+                  <p:par>
+                    <p:cTn id="3" fill="hold">
+                      <p:stCondLst>
+                        <p:cond delay="indefinite"/>
+                      </p:stCondLst>
+                      <p:childTnLst>
+                        <p:par>
+                          <p:cTn id="4" fill="hold">
+                            <p:stCondLst>
+                              <p:cond delay="0"/>
+                            </p:stCondLst>
+                            <p:childTnLst>
+                              <p:par>
+                                <p:cTn id="5" presetID="1" presetClass="entr" presetSubtype="0" fill="hold" grpId="0" nodeType="clickEffect">
+                                  <p:stCondLst>
+                                    <p:cond delay="0"/>
+                                  </p:stCondLst>
+                                  <p:iterate type="lt">
+                                    <p:tmAbs val="100"/>
+                                  </p:iterate>
+                                  <p:childTnLst>
+                                    <p:set>
+                                      <p:cBhvr>
+                                        <p:cTn id="6" dur="1" fill="hold">
+                                          <p:stCondLst>
+                                            <p:cond delay="0"/>
+                                          </p:stCondLst>
+                                        </p:cTn>
+                                        <p:tgtEl>
+                                          <p:spTgt spid="4"/>
+                                        </p:tgtEl>
+                                        <p:attrNameLst>
+                                          <p:attrName>style.visibility</p:attrName>
+                                        </p:attrNameLst>
+                                      </p:cBhvr>
+                                      <p:to>
+                                        <p:strVal val="visible"/>
+                                      </p:to>
+                                    </p:set>
+                                  </p:childTnLst>
+                                </p:cTn>
+                              </p:par>
+                            </p:childTnLst>
+                          </p:cTn>
+                        </p:par>
+                      </p:childTnLst>
+                    </p:cTn>
+                  </p:par>
+                </p:childTnLst>
+              </p:cTn>
+              <p:prevCondLst>
+                <p:cond evt="onPrev" delay="0">
+                  <p:tgtEl>
+                    <p:sldTgt/>
+                  </p:tgtEl>
+                </p:cond>
+              </p:prevCondLst>
+              <p:nextCondLst>
+                <p:cond evt="onNext" delay="0">
+                  <p:tgtEl>
+                    <p:sldTgt/>
+                  </p:tgtEl>
+                </p:cond>
+              </p:nextCondLst>
+            </p:seq>
+          </p:childTnLst>
+        </p:cTn>
+      </p:par>
+    </p:tnLst>
+    <p:bldLst>
+      <p:bldP spid="4" grpId="0"/>
+    </p:bldLst>
+  </p:timing>
+</p:sld>
+</file>
+
+<file path=ppt/slides/slide24.xml><?xml version="1.0" encoding="utf-8"?>
+<p:sld xmlns:a="http://schemas.openxmlformats.org/drawingml/2006/main" xmlns:r="http://schemas.openxmlformats.org/officeDocument/2006/relationships" xmlns:p="http://schemas.openxmlformats.org/presentationml/2006/main">
+  <p:cSld>
+    <p:bg>
+      <p:bgRef idx="1003">
+        <a:schemeClr val="bg2"/>
+      </p:bgRef>
+    </p:bg>
+    <p:spTree>
+      <p:nvGrpSpPr>
+        <p:cNvPr id="1" name=""/>
+        <p:cNvGrpSpPr/>
+        <p:nvPr/>
+      </p:nvGrpSpPr>
+      <p:grpSpPr>
+        <a:xfrm>
+          <a:off x="0" y="0"/>
+          <a:ext cx="0" cy="0"/>
+          <a:chOff x="0" y="0"/>
+          <a:chExt cx="0" cy="0"/>
+        </a:xfrm>
+      </p:grpSpPr>
+      <p:sp>
+        <p:nvSpPr>
+          <p:cNvPr id="4" name="Title 3">
+            <a:extLst>
+              <a:ext uri="{FF2B5EF4-FFF2-40B4-BE49-F238E27FC236}">
+                <a16:creationId xmlns:a16="http://schemas.microsoft.com/office/drawing/2014/main" id="{3BE56E9B-4EEC-4A28-BE4A-3F0917934E7A}"/>
+              </a:ext>
+            </a:extLst>
+          </p:cNvPr>
+          <p:cNvSpPr>
+            <a:spLocks noGrp="1"/>
+          </p:cNvSpPr>
+          <p:nvPr>
+            <p:ph type="title"/>
+          </p:nvPr>
+        </p:nvSpPr>
+        <p:spPr/>
+        <p:txBody>
+          <a:bodyPr>
+            <a:normAutofit/>
+          </a:bodyPr>
+          <a:lstStyle/>
+          <a:p>
+            <a:pPr algn="ctr"/>
+            <a:r>
               <a:rPr lang="en-US" sz="7200">
                 <a:latin typeface="+mn-lt"/>
               </a:rPr>
@@ -7966,7 +8294,7 @@
 </p:sld>
 </file>
 
-<file path=ppt/slides/slide24.xml><?xml version="1.0" encoding="utf-8"?>
+<file path=ppt/slides/slide25.xml><?xml version="1.0" encoding="utf-8"?>
 <p:sld xmlns:a="http://schemas.openxmlformats.org/drawingml/2006/main" xmlns:r="http://schemas.openxmlformats.org/officeDocument/2006/relationships" xmlns:p="http://schemas.openxmlformats.org/presentationml/2006/main">
   <p:cSld>
     <p:bg>
@@ -8157,7 +8485,7 @@
 </p:sld>
 </file>
 
-<file path=ppt/slides/slide25.xml><?xml version="1.0" encoding="utf-8"?>
+<file path=ppt/slides/slide26.xml><?xml version="1.0" encoding="utf-8"?>
 <p:sld xmlns:a="http://schemas.openxmlformats.org/drawingml/2006/main" xmlns:r="http://schemas.openxmlformats.org/officeDocument/2006/relationships" xmlns:p="http://schemas.openxmlformats.org/presentationml/2006/main">
   <p:cSld>
     <p:spTree>
@@ -8242,7 +8570,7 @@
 </p:sld>
 </file>
 
-<file path=ppt/slides/slide26.xml><?xml version="1.0" encoding="utf-8"?>
+<file path=ppt/slides/slide27.xml><?xml version="1.0" encoding="utf-8"?>
 <p:sld xmlns:a="http://schemas.openxmlformats.org/drawingml/2006/main" xmlns:r="http://schemas.openxmlformats.org/officeDocument/2006/relationships" xmlns:p="http://schemas.openxmlformats.org/presentationml/2006/main">
   <p:cSld>
     <p:bg>
@@ -8403,7 +8731,7 @@
 </p:sld>
 </file>
 
-<file path=ppt/slides/slide27.xml><?xml version="1.0" encoding="utf-8"?>
+<file path=ppt/slides/slide28.xml><?xml version="1.0" encoding="utf-8"?>
 <p:sld xmlns:a="http://schemas.openxmlformats.org/drawingml/2006/main" xmlns:r="http://schemas.openxmlformats.org/officeDocument/2006/relationships" xmlns:p="http://schemas.openxmlformats.org/presentationml/2006/main">
   <p:cSld>
     <p:spTree>
@@ -8488,7 +8816,7 @@
 </p:sld>
 </file>
 
-<file path=ppt/slides/slide28.xml><?xml version="1.0" encoding="utf-8"?>
+<file path=ppt/slides/slide29.xml><?xml version="1.0" encoding="utf-8"?>
 <p:sld xmlns:a="http://schemas.openxmlformats.org/drawingml/2006/main" xmlns:r="http://schemas.openxmlformats.org/officeDocument/2006/relationships" xmlns:p="http://schemas.openxmlformats.org/presentationml/2006/main">
   <p:cSld>
     <p:bg>
@@ -8649,7 +8977,246 @@
 </p:sld>
 </file>
 
-<file path=ppt/slides/slide29.xml><?xml version="1.0" encoding="utf-8"?>
+<file path=ppt/slides/slide3.xml><?xml version="1.0" encoding="utf-8"?>
+<p:sld xmlns:a="http://schemas.openxmlformats.org/drawingml/2006/main" xmlns:r="http://schemas.openxmlformats.org/officeDocument/2006/relationships" xmlns:p="http://schemas.openxmlformats.org/presentationml/2006/main">
+  <p:cSld>
+    <p:spTree>
+      <p:nvGrpSpPr>
+        <p:cNvPr id="1" name=""/>
+        <p:cNvGrpSpPr/>
+        <p:nvPr/>
+      </p:nvGrpSpPr>
+      <p:grpSpPr>
+        <a:xfrm>
+          <a:off x="0" y="0"/>
+          <a:ext cx="0" cy="0"/>
+          <a:chOff x="0" y="0"/>
+          <a:chExt cx="0" cy="0"/>
+        </a:xfrm>
+      </p:grpSpPr>
+      <p:sp>
+        <p:nvSpPr>
+          <p:cNvPr id="2" name="Title 1"/>
+          <p:cNvSpPr>
+            <a:spLocks noGrp="1"/>
+          </p:cNvSpPr>
+          <p:nvPr>
+            <p:ph type="title"/>
+          </p:nvPr>
+        </p:nvSpPr>
+        <p:spPr/>
+        <p:txBody>
+          <a:bodyPr/>
+          <a:lstStyle/>
+          <a:p>
+            <a:r>
+              <a:rPr lang="en-US">
+                <a:solidFill>
+                  <a:schemeClr val="accent1">
+                    <a:lumMod val="75000"/>
+                  </a:schemeClr>
+                </a:solidFill>
+              </a:rPr>
+              <a:t>Agenda	</a:t>
+            </a:r>
+          </a:p>
+        </p:txBody>
+      </p:sp>
+      <p:sp>
+        <p:nvSpPr>
+          <p:cNvPr id="3" name="Content Placeholder 2"/>
+          <p:cNvSpPr>
+            <a:spLocks noGrp="1"/>
+          </p:cNvSpPr>
+          <p:nvPr>
+            <p:ph idx="1"/>
+          </p:nvPr>
+        </p:nvSpPr>
+        <p:spPr/>
+        <p:txBody>
+          <a:bodyPr/>
+          <a:lstStyle/>
+          <a:p>
+            <a:pPr marL="457200" indent="-457200">
+              <a:buFont typeface="+mj-lt"/>
+              <a:buAutoNum type="arabicPeriod"/>
+            </a:pPr>
+            <a:r>
+              <a:rPr lang="en-US" dirty="0">
+                <a:solidFill>
+                  <a:schemeClr val="accent1">
+                    <a:lumMod val="50000"/>
+                  </a:schemeClr>
+                </a:solidFill>
+              </a:rPr>
+              <a:t>PHP Overview</a:t>
+            </a:r>
+          </a:p>
+          <a:p>
+            <a:pPr marL="457200" indent="-457200">
+              <a:buFont typeface="+mj-lt"/>
+              <a:buAutoNum type="arabicPeriod"/>
+            </a:pPr>
+            <a:r>
+              <a:rPr lang="en-US" dirty="0">
+                <a:solidFill>
+                  <a:schemeClr val="accent1">
+                    <a:lumMod val="50000"/>
+                  </a:schemeClr>
+                </a:solidFill>
+              </a:rPr>
+              <a:t>Learning by Coding</a:t>
+            </a:r>
+          </a:p>
+          <a:p>
+            <a:pPr marL="713232" lvl="1" indent="-457200">
+              <a:buFont typeface="Arial" panose="020B0604020202020204" pitchFamily="34" charset="0"/>
+              <a:buChar char="•"/>
+            </a:pPr>
+            <a:r>
+              <a:rPr lang="en-US" dirty="0">
+                <a:solidFill>
+                  <a:schemeClr val="accent1">
+                    <a:lumMod val="50000"/>
+                  </a:schemeClr>
+                </a:solidFill>
+              </a:rPr>
+              <a:t>Configuring PHP development environment</a:t>
+            </a:r>
+          </a:p>
+          <a:p>
+            <a:pPr marL="713232" lvl="1" indent="-457200">
+              <a:buFont typeface="Arial" panose="020B0604020202020204" pitchFamily="34" charset="0"/>
+              <a:buChar char="•"/>
+            </a:pPr>
+            <a:r>
+              <a:rPr lang="en-US" dirty="0">
+                <a:solidFill>
+                  <a:schemeClr val="accent1">
+                    <a:lumMod val="50000"/>
+                  </a:schemeClr>
+                </a:solidFill>
+              </a:rPr>
+              <a:t>Setting up the Project</a:t>
+            </a:r>
+          </a:p>
+          <a:p>
+            <a:pPr marL="713232" lvl="1" indent="-457200">
+              <a:buFont typeface="Arial" panose="020B0604020202020204" pitchFamily="34" charset="0"/>
+              <a:buChar char="•"/>
+            </a:pPr>
+            <a:r>
+              <a:rPr lang="en-US" dirty="0">
+                <a:solidFill>
+                  <a:schemeClr val="accent1">
+                    <a:lumMod val="50000"/>
+                  </a:schemeClr>
+                </a:solidFill>
+              </a:rPr>
+              <a:t>Listing and Sorting Inventory Items</a:t>
+            </a:r>
+          </a:p>
+          <a:p>
+            <a:pPr marL="713232" lvl="1" indent="-457200">
+              <a:buFont typeface="Arial" panose="020B0604020202020204" pitchFamily="34" charset="0"/>
+              <a:buChar char="•"/>
+            </a:pPr>
+            <a:r>
+              <a:rPr lang="en-US" dirty="0">
+                <a:solidFill>
+                  <a:schemeClr val="accent1">
+                    <a:lumMod val="50000"/>
+                  </a:schemeClr>
+                </a:solidFill>
+              </a:rPr>
+              <a:t>Adding a Basic Form</a:t>
+            </a:r>
+          </a:p>
+          <a:p>
+            <a:pPr marL="713232" lvl="1" indent="-457200">
+              <a:buFont typeface="Arial" panose="020B0604020202020204" pitchFamily="34" charset="0"/>
+              <a:buChar char="•"/>
+            </a:pPr>
+            <a:r>
+              <a:rPr lang="en-US" dirty="0">
+                <a:solidFill>
+                  <a:schemeClr val="accent1">
+                    <a:lumMod val="50000"/>
+                  </a:schemeClr>
+                </a:solidFill>
+              </a:rPr>
+              <a:t>Enhancing a Form</a:t>
+            </a:r>
+          </a:p>
+          <a:p>
+            <a:pPr marL="0" indent="0">
+              <a:buNone/>
+            </a:pPr>
+            <a:r>
+              <a:rPr lang="en-US" dirty="0">
+                <a:solidFill>
+                  <a:schemeClr val="accent1">
+                    <a:lumMod val="50000"/>
+                  </a:schemeClr>
+                </a:solidFill>
+              </a:rPr>
+              <a:t>3. Review </a:t>
+            </a:r>
+          </a:p>
+          <a:p>
+            <a:pPr marL="713232" lvl="1" indent="-457200">
+              <a:buFont typeface="+mj-lt"/>
+              <a:buAutoNum type="arabicPeriod"/>
+            </a:pPr>
+            <a:endParaRPr lang="en-US" dirty="0">
+              <a:solidFill>
+                <a:schemeClr val="accent1">
+                  <a:lumMod val="50000"/>
+                </a:schemeClr>
+              </a:solidFill>
+            </a:endParaRPr>
+          </a:p>
+          <a:p>
+            <a:pPr marL="713232" lvl="1" indent="-457200">
+              <a:buFont typeface="+mj-lt"/>
+              <a:buAutoNum type="arabicPeriod"/>
+            </a:pPr>
+            <a:endParaRPr lang="en-US" dirty="0">
+              <a:solidFill>
+                <a:schemeClr val="accent1">
+                  <a:lumMod val="50000"/>
+                </a:schemeClr>
+              </a:solidFill>
+            </a:endParaRPr>
+          </a:p>
+        </p:txBody>
+      </p:sp>
+    </p:spTree>
+    <p:extLst>
+      <p:ext uri="{BB962C8B-B14F-4D97-AF65-F5344CB8AC3E}">
+        <p14:creationId xmlns:p14="http://schemas.microsoft.com/office/powerpoint/2010/main" val="2523332612"/>
+      </p:ext>
+    </p:extLst>
+  </p:cSld>
+  <p:clrMapOvr>
+    <a:masterClrMapping/>
+  </p:clrMapOvr>
+  <mc:AlternateContent xmlns:mc="http://schemas.openxmlformats.org/markup-compatibility/2006" xmlns:p14="http://schemas.microsoft.com/office/powerpoint/2010/main">
+    <mc:Choice Requires="p14">
+      <p:transition spd="med" p14:dur="700">
+        <p:fade/>
+      </p:transition>
+    </mc:Choice>
+    <mc:Fallback xmlns="">
+      <p:transition spd="med">
+        <p:fade/>
+      </p:transition>
+    </mc:Fallback>
+  </mc:AlternateContent>
+</p:sld>
+</file>
+
+<file path=ppt/slides/slide30.xml><?xml version="1.0" encoding="utf-8"?>
 <p:sld xmlns:a="http://schemas.openxmlformats.org/drawingml/2006/main" xmlns:r="http://schemas.openxmlformats.org/officeDocument/2006/relationships" xmlns:p="http://schemas.openxmlformats.org/presentationml/2006/main">
   <p:cSld>
     <p:spTree>
@@ -8809,84 +9376,7 @@
 </p:sld>
 </file>
 
-<file path=ppt/slides/slide3.xml><?xml version="1.0" encoding="utf-8"?>
-<p:sld xmlns:a="http://schemas.openxmlformats.org/drawingml/2006/main" xmlns:r="http://schemas.openxmlformats.org/officeDocument/2006/relationships" xmlns:p="http://schemas.openxmlformats.org/presentationml/2006/main">
-  <p:cSld>
-    <p:bg>
-      <p:bgRef idx="1003">
-        <a:schemeClr val="bg2"/>
-      </p:bgRef>
-    </p:bg>
-    <p:spTree>
-      <p:nvGrpSpPr>
-        <p:cNvPr id="1" name=""/>
-        <p:cNvGrpSpPr/>
-        <p:nvPr/>
-      </p:nvGrpSpPr>
-      <p:grpSpPr>
-        <a:xfrm>
-          <a:off x="0" y="0"/>
-          <a:ext cx="0" cy="0"/>
-          <a:chOff x="0" y="0"/>
-          <a:chExt cx="0" cy="0"/>
-        </a:xfrm>
-      </p:grpSpPr>
-      <p:sp>
-        <p:nvSpPr>
-          <p:cNvPr id="4" name="Title 3">
-            <a:extLst>
-              <a:ext uri="{FF2B5EF4-FFF2-40B4-BE49-F238E27FC236}">
-                <a16:creationId xmlns:a16="http://schemas.microsoft.com/office/drawing/2014/main" id="{3BE56E9B-4EEC-4A28-BE4A-3F0917934E7A}"/>
-              </a:ext>
-            </a:extLst>
-          </p:cNvPr>
-          <p:cNvSpPr>
-            <a:spLocks noGrp="1"/>
-          </p:cNvSpPr>
-          <p:nvPr>
-            <p:ph type="title"/>
-          </p:nvPr>
-        </p:nvSpPr>
-        <p:spPr/>
-        <p:txBody>
-          <a:bodyPr>
-            <a:normAutofit/>
-          </a:bodyPr>
-          <a:lstStyle/>
-          <a:p>
-            <a:r>
-              <a:rPr lang="en-US" sz="6600"/>
-              <a:t>PHP Overview</a:t>
-            </a:r>
-          </a:p>
-        </p:txBody>
-      </p:sp>
-    </p:spTree>
-    <p:extLst>
-      <p:ext uri="{BB962C8B-B14F-4D97-AF65-F5344CB8AC3E}">
-        <p14:creationId xmlns:p14="http://schemas.microsoft.com/office/powerpoint/2010/main" val="3989873271"/>
-      </p:ext>
-    </p:extLst>
-  </p:cSld>
-  <p:clrMapOvr>
-    <a:overrideClrMapping bg1="dk1" tx1="lt1" bg2="dk2" tx2="lt2" accent1="accent1" accent2="accent2" accent3="accent3" accent4="accent4" accent5="accent5" accent6="accent6" hlink="hlink" folHlink="folHlink"/>
-  </p:clrMapOvr>
-  <mc:AlternateContent xmlns:mc="http://schemas.openxmlformats.org/markup-compatibility/2006" xmlns:p14="http://schemas.microsoft.com/office/powerpoint/2010/main">
-    <mc:Choice Requires="p14">
-      <p:transition spd="med" p14:dur="700">
-        <p:fade/>
-      </p:transition>
-    </mc:Choice>
-    <mc:Fallback xmlns="">
-      <p:transition spd="med">
-        <p:fade/>
-      </p:transition>
-    </mc:Fallback>
-  </mc:AlternateContent>
-</p:sld>
-</file>
-
-<file path=ppt/slides/slide30.xml><?xml version="1.0" encoding="utf-8"?>
+<file path=ppt/slides/slide31.xml><?xml version="1.0" encoding="utf-8"?>
 <p:sld xmlns:a="http://schemas.openxmlformats.org/drawingml/2006/main" xmlns:r="http://schemas.openxmlformats.org/officeDocument/2006/relationships" xmlns:p="http://schemas.openxmlformats.org/presentationml/2006/main">
   <p:cSld>
     <p:bg>
@@ -9056,7 +9546,7 @@
 </p:sld>
 </file>
 
-<file path=ppt/slides/slide31.xml><?xml version="1.0" encoding="utf-8"?>
+<file path=ppt/slides/slide32.xml><?xml version="1.0" encoding="utf-8"?>
 <p:sld xmlns:a="http://schemas.openxmlformats.org/drawingml/2006/main" xmlns:r="http://schemas.openxmlformats.org/officeDocument/2006/relationships" xmlns:p="http://schemas.openxmlformats.org/presentationml/2006/main">
   <p:cSld>
     <p:bg>
@@ -9222,7 +9712,7 @@
 </p:sld>
 </file>
 
-<file path=ppt/slides/slide32.xml><?xml version="1.0" encoding="utf-8"?>
+<file path=ppt/slides/slide33.xml><?xml version="1.0" encoding="utf-8"?>
 <p:sld xmlns:a="http://schemas.openxmlformats.org/drawingml/2006/main" xmlns:r="http://schemas.openxmlformats.org/officeDocument/2006/relationships" xmlns:p="http://schemas.openxmlformats.org/presentationml/2006/main">
   <p:cSld>
     <p:bg>
@@ -9295,167 +9785,6 @@
   </p:cSld>
   <p:clrMapOvr>
     <a:overrideClrMapping bg1="dk1" tx1="lt1" bg2="dk2" tx2="lt2" accent1="accent1" accent2="accent2" accent3="accent3" accent4="accent4" accent5="accent5" accent6="accent6" hlink="hlink" folHlink="folHlink"/>
-  </p:clrMapOvr>
-  <mc:AlternateContent xmlns:mc="http://schemas.openxmlformats.org/markup-compatibility/2006" xmlns:p14="http://schemas.microsoft.com/office/powerpoint/2010/main">
-    <mc:Choice Requires="p14">
-      <p:transition spd="med" p14:dur="700">
-        <p:fade/>
-      </p:transition>
-    </mc:Choice>
-    <mc:Fallback xmlns="">
-      <p:transition spd="med">
-        <p:fade/>
-      </p:transition>
-    </mc:Fallback>
-  </mc:AlternateContent>
-  <p:timing>
-    <p:tnLst>
-      <p:par>
-        <p:cTn id="1" dur="indefinite" restart="never" nodeType="tmRoot">
-          <p:childTnLst>
-            <p:seq concurrent="1" nextAc="seek">
-              <p:cTn id="2" dur="indefinite" nodeType="mainSeq">
-                <p:childTnLst>
-                  <p:par>
-                    <p:cTn id="3" fill="hold">
-                      <p:stCondLst>
-                        <p:cond delay="indefinite"/>
-                      </p:stCondLst>
-                      <p:childTnLst>
-                        <p:par>
-                          <p:cTn id="4" fill="hold">
-                            <p:stCondLst>
-                              <p:cond delay="0"/>
-                            </p:stCondLst>
-                            <p:childTnLst>
-                              <p:par>
-                                <p:cTn id="5" presetID="1" presetClass="entr" presetSubtype="0" fill="hold" grpId="0" nodeType="clickEffect">
-                                  <p:stCondLst>
-                                    <p:cond delay="0"/>
-                                  </p:stCondLst>
-                                  <p:iterate type="lt">
-                                    <p:tmAbs val="100"/>
-                                  </p:iterate>
-                                  <p:childTnLst>
-                                    <p:set>
-                                      <p:cBhvr>
-                                        <p:cTn id="6" dur="1" fill="hold">
-                                          <p:stCondLst>
-                                            <p:cond delay="0"/>
-                                          </p:stCondLst>
-                                        </p:cTn>
-                                        <p:tgtEl>
-                                          <p:spTgt spid="4"/>
-                                        </p:tgtEl>
-                                        <p:attrNameLst>
-                                          <p:attrName>style.visibility</p:attrName>
-                                        </p:attrNameLst>
-                                      </p:cBhvr>
-                                      <p:to>
-                                        <p:strVal val="visible"/>
-                                      </p:to>
-                                    </p:set>
-                                  </p:childTnLst>
-                                </p:cTn>
-                              </p:par>
-                            </p:childTnLst>
-                          </p:cTn>
-                        </p:par>
-                      </p:childTnLst>
-                    </p:cTn>
-                  </p:par>
-                </p:childTnLst>
-              </p:cTn>
-              <p:prevCondLst>
-                <p:cond evt="onPrev" delay="0">
-                  <p:tgtEl>
-                    <p:sldTgt/>
-                  </p:tgtEl>
-                </p:cond>
-              </p:prevCondLst>
-              <p:nextCondLst>
-                <p:cond evt="onNext" delay="0">
-                  <p:tgtEl>
-                    <p:sldTgt/>
-                  </p:tgtEl>
-                </p:cond>
-              </p:nextCondLst>
-            </p:seq>
-          </p:childTnLst>
-        </p:cTn>
-      </p:par>
-    </p:tnLst>
-    <p:bldLst>
-      <p:bldP spid="4" grpId="0"/>
-    </p:bldLst>
-  </p:timing>
-</p:sld>
-</file>
-
-<file path=ppt/slides/slide33.xml><?xml version="1.0" encoding="utf-8"?>
-<p:sld xmlns:a="http://schemas.openxmlformats.org/drawingml/2006/main" xmlns:r="http://schemas.openxmlformats.org/officeDocument/2006/relationships" xmlns:p="http://schemas.openxmlformats.org/presentationml/2006/main">
-  <p:cSld>
-    <p:spTree>
-      <p:nvGrpSpPr>
-        <p:cNvPr id="1" name=""/>
-        <p:cNvGrpSpPr/>
-        <p:nvPr/>
-      </p:nvGrpSpPr>
-      <p:grpSpPr>
-        <a:xfrm>
-          <a:off x="0" y="0"/>
-          <a:ext cx="0" cy="0"/>
-          <a:chOff x="0" y="0"/>
-          <a:chExt cx="0" cy="0"/>
-        </a:xfrm>
-      </p:grpSpPr>
-      <p:sp>
-        <p:nvSpPr>
-          <p:cNvPr id="4" name="Title 3">
-            <a:extLst>
-              <a:ext uri="{FF2B5EF4-FFF2-40B4-BE49-F238E27FC236}">
-                <a16:creationId xmlns:a16="http://schemas.microsoft.com/office/drawing/2014/main" id="{3BE56E9B-4EEC-4A28-BE4A-3F0917934E7A}"/>
-              </a:ext>
-            </a:extLst>
-          </p:cNvPr>
-          <p:cNvSpPr>
-            <a:spLocks noGrp="1"/>
-          </p:cNvSpPr>
-          <p:nvPr>
-            <p:ph type="title"/>
-          </p:nvPr>
-        </p:nvSpPr>
-        <p:spPr/>
-        <p:txBody>
-          <a:bodyPr>
-            <a:normAutofit/>
-          </a:bodyPr>
-          <a:lstStyle/>
-          <a:p>
-            <a:pPr algn="ctr"/>
-            <a:r>
-              <a:rPr lang="en-US" sz="6600">
-                <a:solidFill>
-                  <a:schemeClr val="accent1">
-                    <a:lumMod val="75000"/>
-                  </a:schemeClr>
-                </a:solidFill>
-                <a:latin typeface="+mn-lt"/>
-              </a:rPr>
-              <a:t>Review</a:t>
-            </a:r>
-          </a:p>
-        </p:txBody>
-      </p:sp>
-    </p:spTree>
-    <p:extLst>
-      <p:ext uri="{BB962C8B-B14F-4D97-AF65-F5344CB8AC3E}">
-        <p14:creationId xmlns:p14="http://schemas.microsoft.com/office/powerpoint/2010/main" val="787375583"/>
-      </p:ext>
-    </p:extLst>
-  </p:cSld>
-  <p:clrMapOvr>
-    <a:masterClrMapping/>
   </p:clrMapOvr>
   <mc:AlternateContent xmlns:mc="http://schemas.openxmlformats.org/markup-compatibility/2006" xmlns:p14="http://schemas.microsoft.com/office/powerpoint/2010/main">
     <mc:Choice Requires="p14">
@@ -9603,6 +9932,167 @@
                 </a:solidFill>
                 <a:latin typeface="+mn-lt"/>
               </a:rPr>
+              <a:t>Review</a:t>
+            </a:r>
+          </a:p>
+        </p:txBody>
+      </p:sp>
+    </p:spTree>
+    <p:extLst>
+      <p:ext uri="{BB962C8B-B14F-4D97-AF65-F5344CB8AC3E}">
+        <p14:creationId xmlns:p14="http://schemas.microsoft.com/office/powerpoint/2010/main" val="787375583"/>
+      </p:ext>
+    </p:extLst>
+  </p:cSld>
+  <p:clrMapOvr>
+    <a:masterClrMapping/>
+  </p:clrMapOvr>
+  <mc:AlternateContent xmlns:mc="http://schemas.openxmlformats.org/markup-compatibility/2006" xmlns:p14="http://schemas.microsoft.com/office/powerpoint/2010/main">
+    <mc:Choice Requires="p14">
+      <p:transition spd="med" p14:dur="700">
+        <p:fade/>
+      </p:transition>
+    </mc:Choice>
+    <mc:Fallback xmlns="">
+      <p:transition spd="med">
+        <p:fade/>
+      </p:transition>
+    </mc:Fallback>
+  </mc:AlternateContent>
+  <p:timing>
+    <p:tnLst>
+      <p:par>
+        <p:cTn id="1" dur="indefinite" restart="never" nodeType="tmRoot">
+          <p:childTnLst>
+            <p:seq concurrent="1" nextAc="seek">
+              <p:cTn id="2" dur="indefinite" nodeType="mainSeq">
+                <p:childTnLst>
+                  <p:par>
+                    <p:cTn id="3" fill="hold">
+                      <p:stCondLst>
+                        <p:cond delay="indefinite"/>
+                      </p:stCondLst>
+                      <p:childTnLst>
+                        <p:par>
+                          <p:cTn id="4" fill="hold">
+                            <p:stCondLst>
+                              <p:cond delay="0"/>
+                            </p:stCondLst>
+                            <p:childTnLst>
+                              <p:par>
+                                <p:cTn id="5" presetID="1" presetClass="entr" presetSubtype="0" fill="hold" grpId="0" nodeType="clickEffect">
+                                  <p:stCondLst>
+                                    <p:cond delay="0"/>
+                                  </p:stCondLst>
+                                  <p:iterate type="lt">
+                                    <p:tmAbs val="100"/>
+                                  </p:iterate>
+                                  <p:childTnLst>
+                                    <p:set>
+                                      <p:cBhvr>
+                                        <p:cTn id="6" dur="1" fill="hold">
+                                          <p:stCondLst>
+                                            <p:cond delay="0"/>
+                                          </p:stCondLst>
+                                        </p:cTn>
+                                        <p:tgtEl>
+                                          <p:spTgt spid="4"/>
+                                        </p:tgtEl>
+                                        <p:attrNameLst>
+                                          <p:attrName>style.visibility</p:attrName>
+                                        </p:attrNameLst>
+                                      </p:cBhvr>
+                                      <p:to>
+                                        <p:strVal val="visible"/>
+                                      </p:to>
+                                    </p:set>
+                                  </p:childTnLst>
+                                </p:cTn>
+                              </p:par>
+                            </p:childTnLst>
+                          </p:cTn>
+                        </p:par>
+                      </p:childTnLst>
+                    </p:cTn>
+                  </p:par>
+                </p:childTnLst>
+              </p:cTn>
+              <p:prevCondLst>
+                <p:cond evt="onPrev" delay="0">
+                  <p:tgtEl>
+                    <p:sldTgt/>
+                  </p:tgtEl>
+                </p:cond>
+              </p:prevCondLst>
+              <p:nextCondLst>
+                <p:cond evt="onNext" delay="0">
+                  <p:tgtEl>
+                    <p:sldTgt/>
+                  </p:tgtEl>
+                </p:cond>
+              </p:nextCondLst>
+            </p:seq>
+          </p:childTnLst>
+        </p:cTn>
+      </p:par>
+    </p:tnLst>
+    <p:bldLst>
+      <p:bldP spid="4" grpId="0"/>
+    </p:bldLst>
+  </p:timing>
+</p:sld>
+</file>
+
+<file path=ppt/slides/slide35.xml><?xml version="1.0" encoding="utf-8"?>
+<p:sld xmlns:a="http://schemas.openxmlformats.org/drawingml/2006/main" xmlns:r="http://schemas.openxmlformats.org/officeDocument/2006/relationships" xmlns:p="http://schemas.openxmlformats.org/presentationml/2006/main">
+  <p:cSld>
+    <p:spTree>
+      <p:nvGrpSpPr>
+        <p:cNvPr id="1" name=""/>
+        <p:cNvGrpSpPr/>
+        <p:nvPr/>
+      </p:nvGrpSpPr>
+      <p:grpSpPr>
+        <a:xfrm>
+          <a:off x="0" y="0"/>
+          <a:ext cx="0" cy="0"/>
+          <a:chOff x="0" y="0"/>
+          <a:chExt cx="0" cy="0"/>
+        </a:xfrm>
+      </p:grpSpPr>
+      <p:sp>
+        <p:nvSpPr>
+          <p:cNvPr id="4" name="Title 3">
+            <a:extLst>
+              <a:ext uri="{FF2B5EF4-FFF2-40B4-BE49-F238E27FC236}">
+                <a16:creationId xmlns:a16="http://schemas.microsoft.com/office/drawing/2014/main" id="{3BE56E9B-4EEC-4A28-BE4A-3F0917934E7A}"/>
+              </a:ext>
+            </a:extLst>
+          </p:cNvPr>
+          <p:cNvSpPr>
+            <a:spLocks noGrp="1"/>
+          </p:cNvSpPr>
+          <p:nvPr>
+            <p:ph type="title"/>
+          </p:nvPr>
+        </p:nvSpPr>
+        <p:spPr/>
+        <p:txBody>
+          <a:bodyPr>
+            <a:normAutofit/>
+          </a:bodyPr>
+          <a:lstStyle/>
+          <a:p>
+            <a:pPr algn="ctr"/>
+            <a:r>
+              <a:rPr lang="en-US" sz="6600">
+                <a:solidFill>
+                  <a:schemeClr val="accent1">
+                    <a:lumMod val="75000"/>
+                  </a:schemeClr>
+                </a:solidFill>
+                <a:latin typeface="+mn-lt"/>
+              </a:rPr>
               <a:t>Q&amp;A</a:t>
             </a:r>
           </a:p>
@@ -9717,6 +10207,11 @@
 <file path=ppt/slides/slide4.xml><?xml version="1.0" encoding="utf-8"?>
 <p:sld xmlns:a="http://schemas.openxmlformats.org/drawingml/2006/main" xmlns:r="http://schemas.openxmlformats.org/officeDocument/2006/relationships" xmlns:p="http://schemas.openxmlformats.org/presentationml/2006/main">
   <p:cSld>
+    <p:bg>
+      <p:bgRef idx="1003">
+        <a:schemeClr val="bg2"/>
+      </p:bgRef>
+    </p:bg>
     <p:spTree>
       <p:nvGrpSpPr>
         <p:cNvPr id="1" name=""/>
@@ -9736,7 +10231,7 @@
           <p:cNvPr id="4" name="Title 3">
             <a:extLst>
               <a:ext uri="{FF2B5EF4-FFF2-40B4-BE49-F238E27FC236}">
-                <a16:creationId xmlns:a16="http://schemas.microsoft.com/office/drawing/2014/main" id="{CE75FD60-5FC2-492F-92F9-9EFB3FC83826}"/>
+                <a16:creationId xmlns:a16="http://schemas.microsoft.com/office/drawing/2014/main" id="{3BE56E9B-4EEC-4A28-BE4A-3F0917934E7A}"/>
               </a:ext>
             </a:extLst>
           </p:cNvPr>
@@ -9745,40 +10240,6 @@
           </p:cNvSpPr>
           <p:nvPr>
             <p:ph type="title"/>
-          </p:nvPr>
-        </p:nvSpPr>
-        <p:spPr/>
-        <p:txBody>
-          <a:bodyPr/>
-          <a:lstStyle/>
-          <a:p>
-            <a:r>
-              <a:rPr lang="en-US">
-                <a:solidFill>
-                  <a:schemeClr val="accent1">
-                    <a:lumMod val="75000"/>
-                  </a:schemeClr>
-                </a:solidFill>
-              </a:rPr>
-              <a:t>PHP Overview</a:t>
-            </a:r>
-          </a:p>
-        </p:txBody>
-      </p:sp>
-      <p:sp>
-        <p:nvSpPr>
-          <p:cNvPr id="5" name="Content Placeholder 4">
-            <a:extLst>
-              <a:ext uri="{FF2B5EF4-FFF2-40B4-BE49-F238E27FC236}">
-                <a16:creationId xmlns:a16="http://schemas.microsoft.com/office/drawing/2014/main" id="{AE9E38D3-9EDC-4176-9BF3-BB33CF66A8CC}"/>
-              </a:ext>
-            </a:extLst>
-          </p:cNvPr>
-          <p:cNvSpPr>
-            <a:spLocks noGrp="1"/>
-          </p:cNvSpPr>
-          <p:nvPr>
-            <p:ph idx="1"/>
           </p:nvPr>
         </p:nvSpPr>
         <p:spPr/>
@@ -9788,212 +10249,22 @@
           </a:bodyPr>
           <a:lstStyle/>
           <a:p>
-            <a:pPr lvl="1">
-              <a:lnSpc>
-                <a:spcPct val="100000"/>
-              </a:lnSpc>
-              <a:spcBef>
-                <a:spcPts val="1200"/>
-              </a:spcBef>
-              <a:spcAft>
-                <a:spcPts val="600"/>
-              </a:spcAft>
-              <a:buFont typeface="Arial" panose="020B0604020202020204" pitchFamily="34" charset="0"/>
-              <a:buChar char="•"/>
-            </a:pPr>
-            <a:r>
-              <a:rPr lang="en-US">
-                <a:solidFill>
-                  <a:schemeClr val="tx1"/>
-                </a:solidFill>
-              </a:rPr>
-              <a:t>A server-side scripting language that enables building dynamic web pages</a:t>
-            </a:r>
-          </a:p>
-          <a:p>
-            <a:pPr lvl="1">
-              <a:lnSpc>
-                <a:spcPct val="100000"/>
-              </a:lnSpc>
-              <a:spcBef>
-                <a:spcPts val="1200"/>
-              </a:spcBef>
-              <a:spcAft>
-                <a:spcPts val="600"/>
-              </a:spcAft>
-              <a:buFont typeface="Arial" panose="020B0604020202020204" pitchFamily="34" charset="0"/>
-              <a:buChar char="•"/>
-            </a:pPr>
-            <a:r>
-              <a:rPr lang="en-US">
-                <a:solidFill>
-                  <a:schemeClr val="tx1"/>
-                </a:solidFill>
-              </a:rPr>
-              <a:t>Successor to a product named PHP/FI, created in 1994 by Rasmus </a:t>
-            </a:r>
-            <a:r>
-              <a:rPr lang="en-US" err="1">
-                <a:solidFill>
-                  <a:schemeClr val="tx1"/>
-                </a:solidFill>
-              </a:rPr>
-              <a:t>Lerdorf</a:t>
-            </a:r>
-            <a:endParaRPr lang="en-US">
-              <a:solidFill>
-                <a:schemeClr val="tx1"/>
-              </a:solidFill>
-            </a:endParaRPr>
-          </a:p>
-          <a:p>
-            <a:pPr lvl="1">
-              <a:lnSpc>
-                <a:spcPct val="100000"/>
-              </a:lnSpc>
-              <a:spcBef>
-                <a:spcPts val="1200"/>
-              </a:spcBef>
-              <a:spcAft>
-                <a:spcPts val="600"/>
-              </a:spcAft>
-              <a:buFont typeface="Arial" panose="020B0604020202020204" pitchFamily="34" charset="0"/>
-              <a:buChar char="•"/>
-            </a:pPr>
-            <a:r>
-              <a:rPr lang="en-US">
-                <a:solidFill>
-                  <a:schemeClr val="tx1"/>
-                </a:solidFill>
-              </a:rPr>
-              <a:t>May contain text, HTML, and script blocks</a:t>
-            </a:r>
-          </a:p>
-          <a:p>
-            <a:pPr lvl="1">
-              <a:lnSpc>
-                <a:spcPct val="100000"/>
-              </a:lnSpc>
-              <a:spcBef>
-                <a:spcPts val="1200"/>
-              </a:spcBef>
-              <a:spcAft>
-                <a:spcPts val="600"/>
-              </a:spcAft>
-              <a:buFont typeface="Arial" panose="020B0604020202020204" pitchFamily="34" charset="0"/>
-              <a:buChar char="•"/>
-            </a:pPr>
-            <a:r>
-              <a:rPr lang="en-US">
-                <a:solidFill>
-                  <a:schemeClr val="tx1"/>
-                </a:solidFill>
-              </a:rPr>
-              <a:t>PHP 5 is currently the most commonly used </a:t>
-            </a:r>
-          </a:p>
-          <a:p>
-            <a:pPr lvl="1">
-              <a:lnSpc>
-                <a:spcPct val="100000"/>
-              </a:lnSpc>
-              <a:spcBef>
-                <a:spcPts val="1200"/>
-              </a:spcBef>
-              <a:spcAft>
-                <a:spcPts val="600"/>
-              </a:spcAft>
-              <a:buFont typeface="Arial" panose="020B0604020202020204" pitchFamily="34" charset="0"/>
-              <a:buChar char="•"/>
-            </a:pPr>
-            <a:r>
-              <a:rPr lang="en-US" err="1">
-                <a:solidFill>
-                  <a:schemeClr val="tx1"/>
-                </a:solidFill>
-              </a:rPr>
-              <a:t>Lastest</a:t>
-            </a:r>
-            <a:r>
-              <a:rPr lang="en-US">
-                <a:solidFill>
-                  <a:schemeClr val="tx1"/>
-                </a:solidFill>
-              </a:rPr>
-              <a:t> version: PHP 7.1</a:t>
-            </a:r>
-          </a:p>
-          <a:p>
-            <a:pPr lvl="1">
-              <a:lnSpc>
-                <a:spcPct val="100000"/>
-              </a:lnSpc>
-              <a:spcBef>
-                <a:spcPts val="1200"/>
-              </a:spcBef>
-              <a:spcAft>
-                <a:spcPts val="600"/>
-              </a:spcAft>
-              <a:buFont typeface="Arial" panose="020B0604020202020204" pitchFamily="34" charset="0"/>
-              <a:buChar char="•"/>
-            </a:pPr>
-            <a:endParaRPr lang="en-US">
-              <a:solidFill>
-                <a:schemeClr val="tx1"/>
-              </a:solidFill>
-            </a:endParaRPr>
-          </a:p>
-          <a:p>
-            <a:pPr lvl="1">
-              <a:lnSpc>
-                <a:spcPct val="100000"/>
-              </a:lnSpc>
-              <a:spcBef>
-                <a:spcPts val="1200"/>
-              </a:spcBef>
-              <a:spcAft>
-                <a:spcPts val="600"/>
-              </a:spcAft>
-              <a:buFont typeface="Arial" panose="020B0604020202020204" pitchFamily="34" charset="0"/>
-              <a:buChar char="•"/>
-            </a:pPr>
-            <a:endParaRPr lang="en-US">
-              <a:solidFill>
-                <a:schemeClr val="tx1"/>
-              </a:solidFill>
-            </a:endParaRPr>
-          </a:p>
-          <a:p>
-            <a:pPr lvl="1">
-              <a:lnSpc>
-                <a:spcPct val="100000"/>
-              </a:lnSpc>
-              <a:spcBef>
-                <a:spcPts val="1200"/>
-              </a:spcBef>
-              <a:spcAft>
-                <a:spcPts val="600"/>
-              </a:spcAft>
-              <a:buFont typeface="Arial" panose="020B0604020202020204" pitchFamily="34" charset="0"/>
-              <a:buChar char="•"/>
-            </a:pPr>
-            <a:endParaRPr lang="en-US">
-              <a:solidFill>
-                <a:schemeClr val="tx1"/>
-              </a:solidFill>
-            </a:endParaRPr>
+            <a:r>
+              <a:rPr lang="en-US" sz="6600"/>
+              <a:t>PHP Overview</a:t>
+            </a:r>
           </a:p>
         </p:txBody>
       </p:sp>
     </p:spTree>
     <p:extLst>
       <p:ext uri="{BB962C8B-B14F-4D97-AF65-F5344CB8AC3E}">
-        <p14:creationId xmlns:p14="http://schemas.microsoft.com/office/powerpoint/2010/main" val="3046724298"/>
+        <p14:creationId xmlns:p14="http://schemas.microsoft.com/office/powerpoint/2010/main" val="3989873271"/>
       </p:ext>
     </p:extLst>
   </p:cSld>
   <p:clrMapOvr>
-    <a:masterClrMapping/>
+    <a:overrideClrMapping bg1="dk1" tx1="lt1" bg2="dk2" tx2="lt2" accent1="accent1" accent2="accent2" accent3="accent3" accent4="accent4" accent5="accent5" accent6="accent6" hlink="hlink" folHlink="folHlink"/>
   </p:clrMapOvr>
   <mc:AlternateContent xmlns:mc="http://schemas.openxmlformats.org/markup-compatibility/2006" xmlns:p14="http://schemas.microsoft.com/office/powerpoint/2010/main">
     <mc:Choice Requires="p14">
@@ -10056,7 +10327,7 @@
                   </a:schemeClr>
                 </a:solidFill>
               </a:rPr>
-              <a:t>Why using PHP?</a:t>
+              <a:t>PHP Overview</a:t>
             </a:r>
           </a:p>
         </p:txBody>
@@ -10088,6 +10359,9 @@
               <a:lnSpc>
                 <a:spcPct val="100000"/>
               </a:lnSpc>
+              <a:spcBef>
+                <a:spcPts val="1200"/>
+              </a:spcBef>
               <a:spcAft>
                 <a:spcPts val="600"/>
               </a:spcAft>
@@ -10100,7 +10374,7 @@
                   <a:schemeClr val="tx1"/>
                 </a:solidFill>
               </a:rPr>
-              <a:t>Friendly with HTML</a:t>
+              <a:t>A server-side scripting language that enables building dynamic web pages</a:t>
             </a:r>
           </a:p>
           <a:p>
@@ -10108,6 +10382,9 @@
               <a:lnSpc>
                 <a:spcPct val="100000"/>
               </a:lnSpc>
+              <a:spcBef>
+                <a:spcPts val="1200"/>
+              </a:spcBef>
               <a:spcAft>
                 <a:spcPts val="600"/>
               </a:spcAft>
@@ -10120,14 +10397,30 @@
                   <a:schemeClr val="tx1"/>
                 </a:solidFill>
               </a:rPr>
-              <a:t>Interactive features</a:t>
-            </a:r>
+              <a:t>Successor to a product named PHP/FI, created in 1994 by Rasmus </a:t>
+            </a:r>
+            <a:r>
+              <a:rPr lang="en-US" err="1">
+                <a:solidFill>
+                  <a:schemeClr val="tx1"/>
+                </a:solidFill>
+              </a:rPr>
+              <a:t>Lerdorf</a:t>
+            </a:r>
+            <a:endParaRPr lang="en-US">
+              <a:solidFill>
+                <a:schemeClr val="tx1"/>
+              </a:solidFill>
+            </a:endParaRPr>
           </a:p>
           <a:p>
             <a:pPr lvl="1">
               <a:lnSpc>
                 <a:spcPct val="100000"/>
               </a:lnSpc>
+              <a:spcBef>
+                <a:spcPts val="1200"/>
+              </a:spcBef>
               <a:spcAft>
                 <a:spcPts val="600"/>
               </a:spcAft>
@@ -10140,7 +10433,7 @@
                   <a:schemeClr val="tx1"/>
                 </a:solidFill>
               </a:rPr>
-              <a:t>Easy to learn</a:t>
+              <a:t>May contain text, HTML, and script blocks</a:t>
             </a:r>
           </a:p>
           <a:p>
@@ -10148,6 +10441,9 @@
               <a:lnSpc>
                 <a:spcPct val="100000"/>
               </a:lnSpc>
+              <a:spcBef>
+                <a:spcPts val="1200"/>
+              </a:spcBef>
               <a:spcAft>
                 <a:spcPts val="600"/>
               </a:spcAft>
@@ -10160,7 +10456,7 @@
                   <a:schemeClr val="tx1"/>
                 </a:solidFill>
               </a:rPr>
-              <a:t>Top-notch Online Documentation</a:t>
+              <a:t>PHP 5 is currently the most commonly used </a:t>
             </a:r>
           </a:p>
           <a:p>
@@ -10168,6 +10464,9 @@
               <a:lnSpc>
                 <a:spcPct val="100000"/>
               </a:lnSpc>
+              <a:spcBef>
+                <a:spcPts val="1200"/>
+              </a:spcBef>
               <a:spcAft>
                 <a:spcPts val="600"/>
               </a:spcAft>
@@ -10175,12 +10474,20 @@
               <a:buChar char="•"/>
             </a:pPr>
             <a:r>
+              <a:rPr lang="en-US" err="1">
+                <a:solidFill>
+                  <a:schemeClr val="tx1"/>
+                </a:solidFill>
+              </a:rPr>
+              <a:t>Lastest</a:t>
+            </a:r>
+            <a:r>
               <a:rPr lang="en-US">
                 <a:solidFill>
                   <a:schemeClr val="tx1"/>
                 </a:solidFill>
               </a:rPr>
-              <a:t>Plenty of Blogs</a:t>
+              <a:t> version: PHP 7.1</a:t>
             </a:r>
           </a:p>
           <a:p>
@@ -10188,46 +10495,9 @@
               <a:lnSpc>
                 <a:spcPct val="100000"/>
               </a:lnSpc>
-              <a:spcAft>
-                <a:spcPts val="600"/>
-              </a:spcAft>
-              <a:buFont typeface="Arial" panose="020B0604020202020204" pitchFamily="34" charset="0"/>
-              <a:buChar char="•"/>
-            </a:pPr>
-            <a:r>
-              <a:rPr lang="en-US">
-                <a:solidFill>
-                  <a:schemeClr val="tx1"/>
-                </a:solidFill>
-              </a:rPr>
-              <a:t>Open Source</a:t>
-            </a:r>
-          </a:p>
-          <a:p>
-            <a:pPr lvl="1">
-              <a:lnSpc>
-                <a:spcPct val="100000"/>
-              </a:lnSpc>
-              <a:spcAft>
-                <a:spcPts val="600"/>
-              </a:spcAft>
-              <a:buFont typeface="Arial" panose="020B0604020202020204" pitchFamily="34" charset="0"/>
-              <a:buChar char="•"/>
-            </a:pPr>
-            <a:r>
-              <a:rPr lang="en-US">
-                <a:solidFill>
-                  <a:schemeClr val="tx1"/>
-                </a:solidFill>
-              </a:rPr>
-              <a:t>Compatible with Databases</a:t>
-            </a:r>
-          </a:p>
-          <a:p>
-            <a:pPr lvl="1">
-              <a:lnSpc>
-                <a:spcPct val="100000"/>
-              </a:lnSpc>
+              <a:spcBef>
+                <a:spcPts val="1200"/>
+              </a:spcBef>
               <a:spcAft>
                 <a:spcPts val="600"/>
               </a:spcAft>
@@ -10245,6 +10515,9 @@
               <a:lnSpc>
                 <a:spcPct val="100000"/>
               </a:lnSpc>
+              <a:spcBef>
+                <a:spcPts val="1200"/>
+              </a:spcBef>
               <a:spcAft>
                 <a:spcPts val="600"/>
               </a:spcAft>
@@ -10262,6 +10535,9 @@
               <a:lnSpc>
                 <a:spcPct val="100000"/>
               </a:lnSpc>
+              <a:spcBef>
+                <a:spcPts val="1200"/>
+              </a:spcBef>
               <a:spcAft>
                 <a:spcPts val="600"/>
               </a:spcAft>
@@ -10279,7 +10555,7 @@
     </p:spTree>
     <p:extLst>
       <p:ext uri="{BB962C8B-B14F-4D97-AF65-F5344CB8AC3E}">
-        <p14:creationId xmlns:p14="http://schemas.microsoft.com/office/powerpoint/2010/main" val="1844778567"/>
+        <p14:creationId xmlns:p14="http://schemas.microsoft.com/office/powerpoint/2010/main" val="3046724298"/>
       </p:ext>
     </p:extLst>
   </p:cSld>
@@ -10347,6 +10623,297 @@
                   </a:schemeClr>
                 </a:solidFill>
               </a:rPr>
+              <a:t>Why using PHP?</a:t>
+            </a:r>
+          </a:p>
+        </p:txBody>
+      </p:sp>
+      <p:sp>
+        <p:nvSpPr>
+          <p:cNvPr id="5" name="Content Placeholder 4">
+            <a:extLst>
+              <a:ext uri="{FF2B5EF4-FFF2-40B4-BE49-F238E27FC236}">
+                <a16:creationId xmlns:a16="http://schemas.microsoft.com/office/drawing/2014/main" id="{AE9E38D3-9EDC-4176-9BF3-BB33CF66A8CC}"/>
+              </a:ext>
+            </a:extLst>
+          </p:cNvPr>
+          <p:cNvSpPr>
+            <a:spLocks noGrp="1"/>
+          </p:cNvSpPr>
+          <p:nvPr>
+            <p:ph idx="1"/>
+          </p:nvPr>
+        </p:nvSpPr>
+        <p:spPr/>
+        <p:txBody>
+          <a:bodyPr>
+            <a:normAutofit/>
+          </a:bodyPr>
+          <a:lstStyle/>
+          <a:p>
+            <a:pPr lvl="1">
+              <a:lnSpc>
+                <a:spcPct val="100000"/>
+              </a:lnSpc>
+              <a:spcAft>
+                <a:spcPts val="600"/>
+              </a:spcAft>
+              <a:buFont typeface="Arial" panose="020B0604020202020204" pitchFamily="34" charset="0"/>
+              <a:buChar char="•"/>
+            </a:pPr>
+            <a:r>
+              <a:rPr lang="en-US">
+                <a:solidFill>
+                  <a:schemeClr val="tx1"/>
+                </a:solidFill>
+              </a:rPr>
+              <a:t>Friendly with HTML</a:t>
+            </a:r>
+          </a:p>
+          <a:p>
+            <a:pPr lvl="1">
+              <a:lnSpc>
+                <a:spcPct val="100000"/>
+              </a:lnSpc>
+              <a:spcAft>
+                <a:spcPts val="600"/>
+              </a:spcAft>
+              <a:buFont typeface="Arial" panose="020B0604020202020204" pitchFamily="34" charset="0"/>
+              <a:buChar char="•"/>
+            </a:pPr>
+            <a:r>
+              <a:rPr lang="en-US">
+                <a:solidFill>
+                  <a:schemeClr val="tx1"/>
+                </a:solidFill>
+              </a:rPr>
+              <a:t>Interactive features</a:t>
+            </a:r>
+          </a:p>
+          <a:p>
+            <a:pPr lvl="1">
+              <a:lnSpc>
+                <a:spcPct val="100000"/>
+              </a:lnSpc>
+              <a:spcAft>
+                <a:spcPts val="600"/>
+              </a:spcAft>
+              <a:buFont typeface="Arial" panose="020B0604020202020204" pitchFamily="34" charset="0"/>
+              <a:buChar char="•"/>
+            </a:pPr>
+            <a:r>
+              <a:rPr lang="en-US">
+                <a:solidFill>
+                  <a:schemeClr val="tx1"/>
+                </a:solidFill>
+              </a:rPr>
+              <a:t>Easy to learn</a:t>
+            </a:r>
+          </a:p>
+          <a:p>
+            <a:pPr lvl="1">
+              <a:lnSpc>
+                <a:spcPct val="100000"/>
+              </a:lnSpc>
+              <a:spcAft>
+                <a:spcPts val="600"/>
+              </a:spcAft>
+              <a:buFont typeface="Arial" panose="020B0604020202020204" pitchFamily="34" charset="0"/>
+              <a:buChar char="•"/>
+            </a:pPr>
+            <a:r>
+              <a:rPr lang="en-US">
+                <a:solidFill>
+                  <a:schemeClr val="tx1"/>
+                </a:solidFill>
+              </a:rPr>
+              <a:t>Top-notch Online Documentation</a:t>
+            </a:r>
+          </a:p>
+          <a:p>
+            <a:pPr lvl="1">
+              <a:lnSpc>
+                <a:spcPct val="100000"/>
+              </a:lnSpc>
+              <a:spcAft>
+                <a:spcPts val="600"/>
+              </a:spcAft>
+              <a:buFont typeface="Arial" panose="020B0604020202020204" pitchFamily="34" charset="0"/>
+              <a:buChar char="•"/>
+            </a:pPr>
+            <a:r>
+              <a:rPr lang="en-US">
+                <a:solidFill>
+                  <a:schemeClr val="tx1"/>
+                </a:solidFill>
+              </a:rPr>
+              <a:t>Plenty of Blogs</a:t>
+            </a:r>
+          </a:p>
+          <a:p>
+            <a:pPr lvl="1">
+              <a:lnSpc>
+                <a:spcPct val="100000"/>
+              </a:lnSpc>
+              <a:spcAft>
+                <a:spcPts val="600"/>
+              </a:spcAft>
+              <a:buFont typeface="Arial" panose="020B0604020202020204" pitchFamily="34" charset="0"/>
+              <a:buChar char="•"/>
+            </a:pPr>
+            <a:r>
+              <a:rPr lang="en-US">
+                <a:solidFill>
+                  <a:schemeClr val="tx1"/>
+                </a:solidFill>
+              </a:rPr>
+              <a:t>Open Source</a:t>
+            </a:r>
+          </a:p>
+          <a:p>
+            <a:pPr lvl="1">
+              <a:lnSpc>
+                <a:spcPct val="100000"/>
+              </a:lnSpc>
+              <a:spcAft>
+                <a:spcPts val="600"/>
+              </a:spcAft>
+              <a:buFont typeface="Arial" panose="020B0604020202020204" pitchFamily="34" charset="0"/>
+              <a:buChar char="•"/>
+            </a:pPr>
+            <a:r>
+              <a:rPr lang="en-US">
+                <a:solidFill>
+                  <a:schemeClr val="tx1"/>
+                </a:solidFill>
+              </a:rPr>
+              <a:t>Compatible with Databases</a:t>
+            </a:r>
+          </a:p>
+          <a:p>
+            <a:pPr lvl="1">
+              <a:lnSpc>
+                <a:spcPct val="100000"/>
+              </a:lnSpc>
+              <a:spcAft>
+                <a:spcPts val="600"/>
+              </a:spcAft>
+              <a:buFont typeface="Arial" panose="020B0604020202020204" pitchFamily="34" charset="0"/>
+              <a:buChar char="•"/>
+            </a:pPr>
+            <a:endParaRPr lang="en-US">
+              <a:solidFill>
+                <a:schemeClr val="tx1"/>
+              </a:solidFill>
+            </a:endParaRPr>
+          </a:p>
+          <a:p>
+            <a:pPr lvl="1">
+              <a:lnSpc>
+                <a:spcPct val="100000"/>
+              </a:lnSpc>
+              <a:spcAft>
+                <a:spcPts val="600"/>
+              </a:spcAft>
+              <a:buFont typeface="Arial" panose="020B0604020202020204" pitchFamily="34" charset="0"/>
+              <a:buChar char="•"/>
+            </a:pPr>
+            <a:endParaRPr lang="en-US">
+              <a:solidFill>
+                <a:schemeClr val="tx1"/>
+              </a:solidFill>
+            </a:endParaRPr>
+          </a:p>
+          <a:p>
+            <a:pPr lvl="1">
+              <a:lnSpc>
+                <a:spcPct val="100000"/>
+              </a:lnSpc>
+              <a:spcAft>
+                <a:spcPts val="600"/>
+              </a:spcAft>
+              <a:buFont typeface="Arial" panose="020B0604020202020204" pitchFamily="34" charset="0"/>
+              <a:buChar char="•"/>
+            </a:pPr>
+            <a:endParaRPr lang="en-US">
+              <a:solidFill>
+                <a:schemeClr val="tx1"/>
+              </a:solidFill>
+            </a:endParaRPr>
+          </a:p>
+        </p:txBody>
+      </p:sp>
+    </p:spTree>
+    <p:extLst>
+      <p:ext uri="{BB962C8B-B14F-4D97-AF65-F5344CB8AC3E}">
+        <p14:creationId xmlns:p14="http://schemas.microsoft.com/office/powerpoint/2010/main" val="1844778567"/>
+      </p:ext>
+    </p:extLst>
+  </p:cSld>
+  <p:clrMapOvr>
+    <a:masterClrMapping/>
+  </p:clrMapOvr>
+  <mc:AlternateContent xmlns:mc="http://schemas.openxmlformats.org/markup-compatibility/2006" xmlns:p14="http://schemas.microsoft.com/office/powerpoint/2010/main">
+    <mc:Choice Requires="p14">
+      <p:transition spd="med" p14:dur="700">
+        <p:fade/>
+      </p:transition>
+    </mc:Choice>
+    <mc:Fallback xmlns="">
+      <p:transition spd="med">
+        <p:fade/>
+      </p:transition>
+    </mc:Fallback>
+  </mc:AlternateContent>
+</p:sld>
+</file>
+
+<file path=ppt/slides/slide7.xml><?xml version="1.0" encoding="utf-8"?>
+<p:sld xmlns:a="http://schemas.openxmlformats.org/drawingml/2006/main" xmlns:r="http://schemas.openxmlformats.org/officeDocument/2006/relationships" xmlns:p="http://schemas.openxmlformats.org/presentationml/2006/main">
+  <p:cSld>
+    <p:spTree>
+      <p:nvGrpSpPr>
+        <p:cNvPr id="1" name=""/>
+        <p:cNvGrpSpPr/>
+        <p:nvPr/>
+      </p:nvGrpSpPr>
+      <p:grpSpPr>
+        <a:xfrm>
+          <a:off x="0" y="0"/>
+          <a:ext cx="0" cy="0"/>
+          <a:chOff x="0" y="0"/>
+          <a:chExt cx="0" cy="0"/>
+        </a:xfrm>
+      </p:grpSpPr>
+      <p:sp>
+        <p:nvSpPr>
+          <p:cNvPr id="4" name="Title 3">
+            <a:extLst>
+              <a:ext uri="{FF2B5EF4-FFF2-40B4-BE49-F238E27FC236}">
+                <a16:creationId xmlns:a16="http://schemas.microsoft.com/office/drawing/2014/main" id="{CE75FD60-5FC2-492F-92F9-9EFB3FC83826}"/>
+              </a:ext>
+            </a:extLst>
+          </p:cNvPr>
+          <p:cNvSpPr>
+            <a:spLocks noGrp="1"/>
+          </p:cNvSpPr>
+          <p:nvPr>
+            <p:ph type="title"/>
+          </p:nvPr>
+        </p:nvSpPr>
+        <p:spPr/>
+        <p:txBody>
+          <a:bodyPr/>
+          <a:lstStyle/>
+          <a:p>
+            <a:r>
+              <a:rPr lang="en-US">
+                <a:solidFill>
+                  <a:schemeClr val="accent1">
+                    <a:lumMod val="75000"/>
+                  </a:schemeClr>
+                </a:solidFill>
+              </a:rPr>
               <a:t>What websites are built with PHP?</a:t>
             </a:r>
           </a:p>
@@ -10556,7 +11123,7 @@
 </p:sld>
 </file>
 
-<file path=ppt/slides/slide7.xml><?xml version="1.0" encoding="utf-8"?>
+<file path=ppt/slides/slide8.xml><?xml version="1.0" encoding="utf-8"?>
 <p:sld xmlns:a="http://schemas.openxmlformats.org/drawingml/2006/main" xmlns:r="http://schemas.openxmlformats.org/officeDocument/2006/relationships" xmlns:p="http://schemas.openxmlformats.org/presentationml/2006/main">
   <p:cSld>
     <p:bg>
@@ -10594,7 +11161,12 @@
             <p:ph type="title"/>
           </p:nvPr>
         </p:nvSpPr>
-        <p:spPr/>
+        <p:spPr>
+          <a:xfrm>
+            <a:off x="540442" y="3047999"/>
+            <a:ext cx="10780776" cy="1012205"/>
+          </a:xfrm>
+        </p:spPr>
         <p:txBody>
           <a:bodyPr>
             <a:normAutofit/>
@@ -10602,8 +11174,265 @@
           <a:lstStyle/>
           <a:p>
             <a:r>
-              <a:rPr lang="en-US" sz="5400"/>
+              <a:rPr lang="en-US" sz="5400" dirty="0"/>
               <a:t>Learning by Coding</a:t>
+            </a:r>
+          </a:p>
+        </p:txBody>
+      </p:sp>
+      <p:sp>
+        <p:nvSpPr>
+          <p:cNvPr id="3" name="Subtitle 2">
+            <a:extLst>
+              <a:ext uri="{FF2B5EF4-FFF2-40B4-BE49-F238E27FC236}">
+                <a16:creationId xmlns:a16="http://schemas.microsoft.com/office/drawing/2014/main" id="{2DD31702-EB1B-4F45-9969-842CFE63A9FF}"/>
+              </a:ext>
+            </a:extLst>
+          </p:cNvPr>
+          <p:cNvSpPr txBox="1">
+            <a:spLocks/>
+          </p:cNvSpPr>
+          <p:nvPr/>
+        </p:nvSpPr>
+        <p:spPr>
+          <a:xfrm>
+            <a:off x="540442" y="4385551"/>
+            <a:ext cx="9228201" cy="1645920"/>
+          </a:xfrm>
+          <a:prstGeom prst="rect">
+            <a:avLst/>
+          </a:prstGeom>
+        </p:spPr>
+        <p:txBody>
+          <a:bodyPr vert="horz" lIns="91440" tIns="45720" rIns="91440" bIns="45720" rtlCol="0" anchor="t">
+            <a:normAutofit/>
+          </a:bodyPr>
+          <a:lstStyle>
+            <a:lvl1pPr marL="0" indent="0" algn="l" defTabSz="914400" rtl="0" eaLnBrk="1" latinLnBrk="0" hangingPunct="1">
+              <a:lnSpc>
+                <a:spcPct val="85000"/>
+              </a:lnSpc>
+              <a:spcBef>
+                <a:spcPts val="1300"/>
+              </a:spcBef>
+              <a:buFont typeface="Arial" pitchFamily="34" charset="0"/>
+              <a:buNone/>
+              <a:defRPr sz="3200" kern="1200">
+                <a:solidFill>
+                  <a:schemeClr val="tx1"/>
+                </a:solidFill>
+                <a:latin typeface="+mj-lt"/>
+                <a:ea typeface="+mn-ea"/>
+                <a:cs typeface="+mn-cs"/>
+              </a:defRPr>
+            </a:lvl1pPr>
+            <a:lvl2pPr marL="457200" indent="0" algn="l" defTabSz="914400" rtl="0" eaLnBrk="1" latinLnBrk="0" hangingPunct="1">
+              <a:lnSpc>
+                <a:spcPct val="85000"/>
+              </a:lnSpc>
+              <a:spcBef>
+                <a:spcPts val="600"/>
+              </a:spcBef>
+              <a:buFont typeface="Arial" pitchFamily="34" charset="0"/>
+              <a:buNone/>
+              <a:defRPr sz="1800" kern="1200">
+                <a:solidFill>
+                  <a:schemeClr val="tx1">
+                    <a:tint val="75000"/>
+                  </a:schemeClr>
+                </a:solidFill>
+                <a:latin typeface="+mn-lt"/>
+                <a:ea typeface="+mn-ea"/>
+                <a:cs typeface="+mn-cs"/>
+              </a:defRPr>
+            </a:lvl2pPr>
+            <a:lvl3pPr marL="914400" indent="0" algn="l" defTabSz="914400" rtl="0" eaLnBrk="1" latinLnBrk="0" hangingPunct="1">
+              <a:lnSpc>
+                <a:spcPct val="85000"/>
+              </a:lnSpc>
+              <a:spcBef>
+                <a:spcPts val="600"/>
+              </a:spcBef>
+              <a:buFont typeface="Arial" pitchFamily="34" charset="0"/>
+              <a:buNone/>
+              <a:defRPr sz="1600" i="1" kern="1200">
+                <a:solidFill>
+                  <a:schemeClr val="tx1">
+                    <a:tint val="75000"/>
+                  </a:schemeClr>
+                </a:solidFill>
+                <a:latin typeface="+mn-lt"/>
+                <a:ea typeface="+mn-ea"/>
+                <a:cs typeface="+mn-cs"/>
+              </a:defRPr>
+            </a:lvl3pPr>
+            <a:lvl4pPr marL="1371600" indent="0" algn="l" defTabSz="914400" rtl="0" eaLnBrk="1" latinLnBrk="0" hangingPunct="1">
+              <a:lnSpc>
+                <a:spcPct val="85000"/>
+              </a:lnSpc>
+              <a:spcBef>
+                <a:spcPts val="600"/>
+              </a:spcBef>
+              <a:buFont typeface="Arial" pitchFamily="34" charset="0"/>
+              <a:buNone/>
+              <a:defRPr sz="1400" kern="1200">
+                <a:solidFill>
+                  <a:schemeClr val="tx1">
+                    <a:tint val="75000"/>
+                  </a:schemeClr>
+                </a:solidFill>
+                <a:latin typeface="+mn-lt"/>
+                <a:ea typeface="+mn-ea"/>
+                <a:cs typeface="+mn-cs"/>
+              </a:defRPr>
+            </a:lvl4pPr>
+            <a:lvl5pPr marL="1828800" indent="0" algn="l" defTabSz="914400" rtl="0" eaLnBrk="1" latinLnBrk="0" hangingPunct="1">
+              <a:lnSpc>
+                <a:spcPct val="85000"/>
+              </a:lnSpc>
+              <a:spcBef>
+                <a:spcPts val="600"/>
+              </a:spcBef>
+              <a:buFont typeface="Arial" pitchFamily="34" charset="0"/>
+              <a:buNone/>
+              <a:defRPr sz="1400" kern="1200">
+                <a:solidFill>
+                  <a:schemeClr val="tx1">
+                    <a:tint val="75000"/>
+                  </a:schemeClr>
+                </a:solidFill>
+                <a:latin typeface="+mn-lt"/>
+                <a:ea typeface="+mn-ea"/>
+                <a:cs typeface="+mn-cs"/>
+              </a:defRPr>
+            </a:lvl5pPr>
+            <a:lvl6pPr marL="2286000" indent="0" algn="l" defTabSz="914400" rtl="0" eaLnBrk="1" latinLnBrk="0" hangingPunct="1">
+              <a:lnSpc>
+                <a:spcPct val="85000"/>
+              </a:lnSpc>
+              <a:spcBef>
+                <a:spcPts val="600"/>
+              </a:spcBef>
+              <a:buFont typeface="Arial" pitchFamily="34" charset="0"/>
+              <a:buNone/>
+              <a:defRPr sz="1400" kern="1200">
+                <a:solidFill>
+                  <a:schemeClr val="tx1">
+                    <a:tint val="75000"/>
+                  </a:schemeClr>
+                </a:solidFill>
+                <a:latin typeface="+mn-lt"/>
+                <a:ea typeface="+mn-ea"/>
+                <a:cs typeface="+mn-cs"/>
+              </a:defRPr>
+            </a:lvl6pPr>
+            <a:lvl7pPr marL="2743200" indent="0" algn="l" defTabSz="914400" rtl="0" eaLnBrk="1" latinLnBrk="0" hangingPunct="1">
+              <a:lnSpc>
+                <a:spcPct val="85000"/>
+              </a:lnSpc>
+              <a:spcBef>
+                <a:spcPts val="600"/>
+              </a:spcBef>
+              <a:buFont typeface="Arial" pitchFamily="34" charset="0"/>
+              <a:buNone/>
+              <a:defRPr sz="1400" kern="1200">
+                <a:solidFill>
+                  <a:schemeClr val="tx1">
+                    <a:tint val="75000"/>
+                  </a:schemeClr>
+                </a:solidFill>
+                <a:latin typeface="+mn-lt"/>
+                <a:ea typeface="+mn-ea"/>
+                <a:cs typeface="+mn-cs"/>
+              </a:defRPr>
+            </a:lvl7pPr>
+            <a:lvl8pPr marL="3200400" indent="0" algn="l" defTabSz="914400" rtl="0" eaLnBrk="1" latinLnBrk="0" hangingPunct="1">
+              <a:lnSpc>
+                <a:spcPct val="85000"/>
+              </a:lnSpc>
+              <a:spcBef>
+                <a:spcPts val="600"/>
+              </a:spcBef>
+              <a:buFont typeface="Arial" pitchFamily="34" charset="0"/>
+              <a:buNone/>
+              <a:defRPr sz="1400" kern="1200">
+                <a:solidFill>
+                  <a:schemeClr val="tx1">
+                    <a:tint val="75000"/>
+                  </a:schemeClr>
+                </a:solidFill>
+                <a:latin typeface="+mn-lt"/>
+                <a:ea typeface="+mn-ea"/>
+                <a:cs typeface="+mn-cs"/>
+              </a:defRPr>
+            </a:lvl8pPr>
+            <a:lvl9pPr marL="3657600" indent="0" algn="l" defTabSz="914400" rtl="0" eaLnBrk="1" latinLnBrk="0" hangingPunct="1">
+              <a:lnSpc>
+                <a:spcPct val="85000"/>
+              </a:lnSpc>
+              <a:spcBef>
+                <a:spcPts val="600"/>
+              </a:spcBef>
+              <a:buFont typeface="Arial" pitchFamily="34" charset="0"/>
+              <a:buNone/>
+              <a:defRPr sz="1400" kern="1200">
+                <a:solidFill>
+                  <a:schemeClr val="tx1">
+                    <a:tint val="75000"/>
+                  </a:schemeClr>
+                </a:solidFill>
+                <a:latin typeface="+mn-lt"/>
+                <a:ea typeface="+mn-ea"/>
+                <a:cs typeface="+mn-cs"/>
+              </a:defRPr>
+            </a:lvl9pPr>
+          </a:lstStyle>
+          <a:p>
+            <a:r>
+              <a:rPr lang="en-US" sz="2400" b="1" dirty="0">
+                <a:latin typeface="Calibri" panose="020F0502020204030204" pitchFamily="34" charset="0"/>
+                <a:cs typeface="Calibri" panose="020F0502020204030204" pitchFamily="34" charset="0"/>
+              </a:rPr>
+              <a:t>Based on</a:t>
+            </a:r>
+            <a:r>
+              <a:rPr lang="en-US" sz="2400" dirty="0">
+                <a:latin typeface="Calibri" panose="020F0502020204030204" pitchFamily="34" charset="0"/>
+                <a:cs typeface="Calibri" panose="020F0502020204030204" pitchFamily="34" charset="0"/>
+              </a:rPr>
+              <a:t>: Team Tree House’s Build a Basic PHP Website course</a:t>
+            </a:r>
+          </a:p>
+          <a:p>
+            <a:r>
+              <a:rPr lang="en-US" sz="1600" b="1" dirty="0">
+                <a:latin typeface="Calibri Light" panose="020F0302020204030204" pitchFamily="34" charset="0"/>
+                <a:cs typeface="Calibri Light" panose="020F0302020204030204" pitchFamily="34" charset="0"/>
+              </a:rPr>
+              <a:t>Content customized by</a:t>
+            </a:r>
+            <a:r>
+              <a:rPr lang="en-US" sz="1600" dirty="0">
+                <a:latin typeface="Calibri Light" panose="020F0302020204030204" pitchFamily="34" charset="0"/>
+                <a:cs typeface="Calibri Light" panose="020F0302020204030204" pitchFamily="34" charset="0"/>
+              </a:rPr>
+              <a:t>: Thai Ly Anh Khue</a:t>
+            </a:r>
+          </a:p>
+          <a:p>
+            <a:r>
+              <a:rPr lang="en-US" sz="1600" b="1" dirty="0">
+                <a:latin typeface="Calibri Light" panose="020F0302020204030204" pitchFamily="34" charset="0"/>
+                <a:cs typeface="Calibri Light" panose="020F0302020204030204" pitchFamily="34" charset="0"/>
+              </a:rPr>
+              <a:t>UI customized by</a:t>
+            </a:r>
+            <a:r>
+              <a:rPr lang="en-US" sz="1600" dirty="0">
+                <a:latin typeface="Calibri Light" panose="020F0302020204030204" pitchFamily="34" charset="0"/>
+                <a:cs typeface="Calibri Light" panose="020F0302020204030204" pitchFamily="34" charset="0"/>
+              </a:rPr>
+              <a:t>: Dam Thi Thien Nhi</a:t>
             </a:r>
           </a:p>
         </p:txBody>
@@ -10617,343 +11446,6 @@
   </p:cSld>
   <p:clrMapOvr>
     <a:overrideClrMapping bg1="dk1" tx1="lt1" bg2="dk2" tx2="lt2" accent1="accent1" accent2="accent2" accent3="accent3" accent4="accent4" accent5="accent5" accent6="accent6" hlink="hlink" folHlink="folHlink"/>
-  </p:clrMapOvr>
-  <mc:AlternateContent xmlns:mc="http://schemas.openxmlformats.org/markup-compatibility/2006" xmlns:p14="http://schemas.microsoft.com/office/powerpoint/2010/main">
-    <mc:Choice Requires="p14">
-      <p:transition spd="med" p14:dur="700">
-        <p:fade/>
-      </p:transition>
-    </mc:Choice>
-    <mc:Fallback xmlns="">
-      <p:transition spd="med">
-        <p:fade/>
-      </p:transition>
-    </mc:Fallback>
-  </mc:AlternateContent>
-</p:sld>
-</file>
-
-<file path=ppt/slides/slide8.xml><?xml version="1.0" encoding="utf-8"?>
-<p:sld xmlns:a="http://schemas.openxmlformats.org/drawingml/2006/main" xmlns:r="http://schemas.openxmlformats.org/officeDocument/2006/relationships" xmlns:p="http://schemas.openxmlformats.org/presentationml/2006/main">
-  <p:cSld>
-    <p:spTree>
-      <p:nvGrpSpPr>
-        <p:cNvPr id="1" name=""/>
-        <p:cNvGrpSpPr/>
-        <p:nvPr/>
-      </p:nvGrpSpPr>
-      <p:grpSpPr>
-        <a:xfrm>
-          <a:off x="0" y="0"/>
-          <a:ext cx="0" cy="0"/>
-          <a:chOff x="0" y="0"/>
-          <a:chExt cx="0" cy="0"/>
-        </a:xfrm>
-      </p:grpSpPr>
-      <p:sp>
-        <p:nvSpPr>
-          <p:cNvPr id="4" name="Title 3">
-            <a:extLst>
-              <a:ext uri="{FF2B5EF4-FFF2-40B4-BE49-F238E27FC236}">
-                <a16:creationId xmlns:a16="http://schemas.microsoft.com/office/drawing/2014/main" id="{CE75FD60-5FC2-492F-92F9-9EFB3FC83826}"/>
-              </a:ext>
-            </a:extLst>
-          </p:cNvPr>
-          <p:cNvSpPr>
-            <a:spLocks noGrp="1"/>
-          </p:cNvSpPr>
-          <p:nvPr>
-            <p:ph type="title"/>
-          </p:nvPr>
-        </p:nvSpPr>
-        <p:spPr/>
-        <p:txBody>
-          <a:bodyPr>
-            <a:normAutofit/>
-          </a:bodyPr>
-          <a:lstStyle/>
-          <a:p>
-            <a:r>
-              <a:rPr lang="en-US" sz="4400">
-                <a:solidFill>
-                  <a:schemeClr val="accent1">
-                    <a:lumMod val="75000"/>
-                  </a:schemeClr>
-                </a:solidFill>
-              </a:rPr>
-              <a:t>Configuring PHP Development Environment</a:t>
-            </a:r>
-          </a:p>
-        </p:txBody>
-      </p:sp>
-      <p:sp>
-        <p:nvSpPr>
-          <p:cNvPr id="5" name="Content Placeholder 4">
-            <a:extLst>
-              <a:ext uri="{FF2B5EF4-FFF2-40B4-BE49-F238E27FC236}">
-                <a16:creationId xmlns:a16="http://schemas.microsoft.com/office/drawing/2014/main" id="{AE9E38D3-9EDC-4176-9BF3-BB33CF66A8CC}"/>
-              </a:ext>
-            </a:extLst>
-          </p:cNvPr>
-          <p:cNvSpPr>
-            <a:spLocks noGrp="1"/>
-          </p:cNvSpPr>
-          <p:nvPr>
-            <p:ph idx="1"/>
-          </p:nvPr>
-        </p:nvSpPr>
-        <p:spPr/>
-        <p:txBody>
-          <a:bodyPr>
-            <a:normAutofit/>
-          </a:bodyPr>
-          <a:lstStyle/>
-          <a:p>
-            <a:pPr lvl="1">
-              <a:lnSpc>
-                <a:spcPct val="100000"/>
-              </a:lnSpc>
-              <a:spcBef>
-                <a:spcPts val="1200"/>
-              </a:spcBef>
-              <a:spcAft>
-                <a:spcPts val="600"/>
-              </a:spcAft>
-              <a:buFont typeface="Arial" panose="020B0604020202020204" pitchFamily="34" charset="0"/>
-              <a:buChar char="•"/>
-            </a:pPr>
-            <a:r>
-              <a:rPr lang="en-US">
-                <a:solidFill>
-                  <a:schemeClr val="accent1">
-                    <a:lumMod val="50000"/>
-                  </a:schemeClr>
-                </a:solidFill>
-              </a:rPr>
-              <a:t>Install XAMPP, included Apache, PHP and MySQL</a:t>
-            </a:r>
-          </a:p>
-          <a:p>
-            <a:pPr lvl="1">
-              <a:lnSpc>
-                <a:spcPct val="100000"/>
-              </a:lnSpc>
-              <a:spcBef>
-                <a:spcPts val="1200"/>
-              </a:spcBef>
-              <a:spcAft>
-                <a:spcPts val="600"/>
-              </a:spcAft>
-              <a:buFont typeface="Arial" panose="020B0604020202020204" pitchFamily="34" charset="0"/>
-              <a:buChar char="•"/>
-            </a:pPr>
-            <a:r>
-              <a:rPr lang="en-US">
-                <a:solidFill>
-                  <a:schemeClr val="accent1">
-                    <a:lumMod val="50000"/>
-                  </a:schemeClr>
-                </a:solidFill>
-              </a:rPr>
-              <a:t>Successfully run localhost using XAMPP</a:t>
-            </a:r>
-          </a:p>
-          <a:p>
-            <a:pPr lvl="1">
-              <a:lnSpc>
-                <a:spcPct val="100000"/>
-              </a:lnSpc>
-              <a:spcBef>
-                <a:spcPts val="1200"/>
-              </a:spcBef>
-              <a:spcAft>
-                <a:spcPts val="600"/>
-              </a:spcAft>
-              <a:buFont typeface="Arial" panose="020B0604020202020204" pitchFamily="34" charset="0"/>
-              <a:buChar char="•"/>
-            </a:pPr>
-            <a:r>
-              <a:rPr lang="en-US">
-                <a:solidFill>
-                  <a:schemeClr val="accent1">
-                    <a:lumMod val="50000"/>
-                  </a:schemeClr>
-                </a:solidFill>
-              </a:rPr>
-              <a:t>Install PHPStorm</a:t>
-            </a:r>
-          </a:p>
-          <a:p>
-            <a:pPr lvl="1">
-              <a:lnSpc>
-                <a:spcPct val="100000"/>
-              </a:lnSpc>
-              <a:spcBef>
-                <a:spcPts val="1200"/>
-              </a:spcBef>
-              <a:spcAft>
-                <a:spcPts val="600"/>
-              </a:spcAft>
-              <a:buFont typeface="Arial" panose="020B0604020202020204" pitchFamily="34" charset="0"/>
-              <a:buChar char="•"/>
-            </a:pPr>
-            <a:r>
-              <a:rPr lang="en-US">
-                <a:solidFill>
-                  <a:schemeClr val="accent1">
-                    <a:lumMod val="50000"/>
-                  </a:schemeClr>
-                </a:solidFill>
-              </a:rPr>
-              <a:t>Configure Local PHP Interpreters</a:t>
-            </a:r>
-          </a:p>
-          <a:p>
-            <a:pPr lvl="1">
-              <a:lnSpc>
-                <a:spcPct val="100000"/>
-              </a:lnSpc>
-              <a:spcBef>
-                <a:spcPts val="1200"/>
-              </a:spcBef>
-              <a:spcAft>
-                <a:spcPts val="600"/>
-              </a:spcAft>
-              <a:buFont typeface="Arial" panose="020B0604020202020204" pitchFamily="34" charset="0"/>
-              <a:buChar char="•"/>
-            </a:pPr>
-            <a:r>
-              <a:rPr lang="en-US">
-                <a:solidFill>
-                  <a:schemeClr val="accent1">
-                    <a:lumMod val="50000"/>
-                  </a:schemeClr>
-                </a:solidFill>
-              </a:rPr>
-              <a:t>Deploy a project from PHPStorm to Local Server</a:t>
-            </a:r>
-          </a:p>
-          <a:p>
-            <a:pPr lvl="1">
-              <a:lnSpc>
-                <a:spcPct val="100000"/>
-              </a:lnSpc>
-              <a:spcBef>
-                <a:spcPts val="1200"/>
-              </a:spcBef>
-              <a:spcAft>
-                <a:spcPts val="600"/>
-              </a:spcAft>
-              <a:buFont typeface="Arial" panose="020B0604020202020204" pitchFamily="34" charset="0"/>
-              <a:buChar char="•"/>
-            </a:pPr>
-            <a:endParaRPr lang="en-US">
-              <a:solidFill>
-                <a:schemeClr val="accent1">
-                  <a:lumMod val="50000"/>
-                </a:schemeClr>
-              </a:solidFill>
-            </a:endParaRPr>
-          </a:p>
-          <a:p>
-            <a:pPr lvl="1">
-              <a:lnSpc>
-                <a:spcPct val="100000"/>
-              </a:lnSpc>
-              <a:spcBef>
-                <a:spcPts val="1200"/>
-              </a:spcBef>
-              <a:spcAft>
-                <a:spcPts val="600"/>
-              </a:spcAft>
-              <a:buFont typeface="Arial" panose="020B0604020202020204" pitchFamily="34" charset="0"/>
-              <a:buChar char="•"/>
-            </a:pPr>
-            <a:endParaRPr lang="en-US">
-              <a:solidFill>
-                <a:schemeClr val="accent1">
-                  <a:lumMod val="50000"/>
-                </a:schemeClr>
-              </a:solidFill>
-            </a:endParaRPr>
-          </a:p>
-          <a:p>
-            <a:pPr lvl="1">
-              <a:lnSpc>
-                <a:spcPct val="100000"/>
-              </a:lnSpc>
-              <a:spcBef>
-                <a:spcPts val="1200"/>
-              </a:spcBef>
-              <a:spcAft>
-                <a:spcPts val="600"/>
-              </a:spcAft>
-              <a:buFont typeface="Arial" panose="020B0604020202020204" pitchFamily="34" charset="0"/>
-              <a:buChar char="•"/>
-            </a:pPr>
-            <a:endParaRPr lang="en-US">
-              <a:solidFill>
-                <a:schemeClr val="accent1">
-                  <a:lumMod val="50000"/>
-                </a:schemeClr>
-              </a:solidFill>
-            </a:endParaRPr>
-          </a:p>
-          <a:p>
-            <a:pPr lvl="1">
-              <a:lnSpc>
-                <a:spcPct val="100000"/>
-              </a:lnSpc>
-              <a:spcBef>
-                <a:spcPts val="1200"/>
-              </a:spcBef>
-              <a:spcAft>
-                <a:spcPts val="600"/>
-              </a:spcAft>
-              <a:buFont typeface="Arial" panose="020B0604020202020204" pitchFamily="34" charset="0"/>
-              <a:buChar char="•"/>
-            </a:pPr>
-            <a:endParaRPr lang="en-US">
-              <a:solidFill>
-                <a:schemeClr val="accent1">
-                  <a:lumMod val="50000"/>
-                </a:schemeClr>
-              </a:solidFill>
-            </a:endParaRPr>
-          </a:p>
-          <a:p>
-            <a:pPr lvl="1">
-              <a:lnSpc>
-                <a:spcPct val="100000"/>
-              </a:lnSpc>
-              <a:spcBef>
-                <a:spcPts val="1200"/>
-              </a:spcBef>
-              <a:spcAft>
-                <a:spcPts val="600"/>
-              </a:spcAft>
-              <a:buFont typeface="Arial" panose="020B0604020202020204" pitchFamily="34" charset="0"/>
-              <a:buChar char="•"/>
-            </a:pPr>
-            <a:endParaRPr lang="en-US">
-              <a:solidFill>
-                <a:schemeClr val="accent1">
-                  <a:lumMod val="50000"/>
-                </a:schemeClr>
-              </a:solidFill>
-            </a:endParaRPr>
-          </a:p>
-        </p:txBody>
-      </p:sp>
-    </p:spTree>
-    <p:extLst>
-      <p:ext uri="{BB962C8B-B14F-4D97-AF65-F5344CB8AC3E}">
-        <p14:creationId xmlns:p14="http://schemas.microsoft.com/office/powerpoint/2010/main" val="3552375232"/>
-      </p:ext>
-    </p:extLst>
-  </p:cSld>
-  <p:clrMapOvr>
-    <a:masterClrMapping/>
   </p:clrMapOvr>
   <mc:AlternateContent xmlns:mc="http://schemas.openxmlformats.org/markup-compatibility/2006" xmlns:p14="http://schemas.microsoft.com/office/powerpoint/2010/main">
     <mc:Choice Requires="p14">
@@ -11011,14 +11503,14 @@
           <a:lstStyle/>
           <a:p>
             <a:r>
-              <a:rPr lang="en-US">
+              <a:rPr lang="en-US" sz="4400">
                 <a:solidFill>
                   <a:schemeClr val="accent1">
                     <a:lumMod val="75000"/>
                   </a:schemeClr>
                 </a:solidFill>
               </a:rPr>
-              <a:t>Setting up the Project</a:t>
+              <a:t>Configuring PHP Development Environment</a:t>
             </a:r>
           </a:p>
         </p:txBody>
@@ -11048,7 +11540,7 @@
           <a:p>
             <a:pPr lvl="1">
               <a:lnSpc>
-                <a:spcPct val="200000"/>
+                <a:spcPct val="100000"/>
               </a:lnSpc>
               <a:spcBef>
                 <a:spcPts val="1200"/>
@@ -11067,13 +11559,13 @@
                   </a:schemeClr>
                 </a:solidFill>
               </a:rPr>
-              <a:t>Copy core files for the project</a:t>
+              <a:t>Install XAMPP, included Apache, PHP and MySQL</a:t>
             </a:r>
           </a:p>
           <a:p>
             <a:pPr lvl="1">
               <a:lnSpc>
-                <a:spcPct val="200000"/>
+                <a:spcPct val="100000"/>
               </a:lnSpc>
               <a:spcBef>
                 <a:spcPts val="1200"/>
@@ -11092,13 +11584,13 @@
                   </a:schemeClr>
                 </a:solidFill>
               </a:rPr>
-              <a:t>Deploy project on localhost</a:t>
+              <a:t>Successfully run localhost using XAMPP</a:t>
             </a:r>
           </a:p>
           <a:p>
             <a:pPr lvl="1">
               <a:lnSpc>
-                <a:spcPct val="200000"/>
+                <a:spcPct val="100000"/>
               </a:lnSpc>
               <a:spcBef>
                 <a:spcPts val="1200"/>
@@ -11117,13 +11609,63 @@
                   </a:schemeClr>
                 </a:solidFill>
               </a:rPr>
-              <a:t>Open the project in PHPStorm</a:t>
+              <a:t>Install PHPStorm</a:t>
             </a:r>
           </a:p>
           <a:p>
             <a:pPr lvl="1">
               <a:lnSpc>
-                <a:spcPct val="200000"/>
+                <a:spcPct val="100000"/>
+              </a:lnSpc>
+              <a:spcBef>
+                <a:spcPts val="1200"/>
+              </a:spcBef>
+              <a:spcAft>
+                <a:spcPts val="600"/>
+              </a:spcAft>
+              <a:buFont typeface="Arial" panose="020B0604020202020204" pitchFamily="34" charset="0"/>
+              <a:buChar char="•"/>
+            </a:pPr>
+            <a:r>
+              <a:rPr lang="en-US">
+                <a:solidFill>
+                  <a:schemeClr val="accent1">
+                    <a:lumMod val="50000"/>
+                  </a:schemeClr>
+                </a:solidFill>
+              </a:rPr>
+              <a:t>Configure Local PHP Interpreters</a:t>
+            </a:r>
+          </a:p>
+          <a:p>
+            <a:pPr lvl="1">
+              <a:lnSpc>
+                <a:spcPct val="100000"/>
+              </a:lnSpc>
+              <a:spcBef>
+                <a:spcPts val="1200"/>
+              </a:spcBef>
+              <a:spcAft>
+                <a:spcPts val="600"/>
+              </a:spcAft>
+              <a:buFont typeface="Arial" panose="020B0604020202020204" pitchFamily="34" charset="0"/>
+              <a:buChar char="•"/>
+            </a:pPr>
+            <a:r>
+              <a:rPr lang="en-US">
+                <a:solidFill>
+                  <a:schemeClr val="accent1">
+                    <a:lumMod val="50000"/>
+                  </a:schemeClr>
+                </a:solidFill>
+              </a:rPr>
+              <a:t>Deploy a project from PHPStorm to Local Server</a:t>
+            </a:r>
+          </a:p>
+          <a:p>
+            <a:pPr lvl="1">
+              <a:lnSpc>
+                <a:spcPct val="100000"/>
               </a:lnSpc>
               <a:spcBef>
                 <a:spcPts val="1200"/>
@@ -11145,7 +11687,7 @@
           <a:p>
             <a:pPr lvl="1">
               <a:lnSpc>
-                <a:spcPct val="200000"/>
+                <a:spcPct val="100000"/>
               </a:lnSpc>
               <a:spcBef>
                 <a:spcPts val="1200"/>
@@ -11167,7 +11709,7 @@
           <a:p>
             <a:pPr lvl="1">
               <a:lnSpc>
-                <a:spcPct val="200000"/>
+                <a:spcPct val="100000"/>
               </a:lnSpc>
               <a:spcBef>
                 <a:spcPts val="1200"/>
@@ -11189,7 +11731,7 @@
           <a:p>
             <a:pPr lvl="1">
               <a:lnSpc>
-                <a:spcPct val="200000"/>
+                <a:spcPct val="100000"/>
               </a:lnSpc>
               <a:spcBef>
                 <a:spcPts val="1200"/>
@@ -11211,7 +11753,7 @@
           <a:p>
             <a:pPr lvl="1">
               <a:lnSpc>
-                <a:spcPct val="200000"/>
+                <a:spcPct val="100000"/>
               </a:lnSpc>
               <a:spcBef>
                 <a:spcPts val="1200"/>
@@ -11235,7 +11777,7 @@
     </p:spTree>
     <p:extLst>
       <p:ext uri="{BB962C8B-B14F-4D97-AF65-F5344CB8AC3E}">
-        <p14:creationId xmlns:p14="http://schemas.microsoft.com/office/powerpoint/2010/main" val="1067580762"/>
+        <p14:creationId xmlns:p14="http://schemas.microsoft.com/office/powerpoint/2010/main" val="3552375232"/>
       </p:ext>
     </p:extLst>
   </p:cSld>
@@ -12122,6 +12664,15 @@
 </file>
 
 <file path=customXml/item2.xml><?xml version="1.0" encoding="utf-8"?>
+<?mso-contentType ?>
+<FormTemplates xmlns="http://schemas.microsoft.com/sharepoint/v3/contenttype/forms">
+  <Display>DocumentLibraryForm</Display>
+  <Edit>DocumentLibraryForm</Edit>
+  <New>DocumentLibraryForm</New>
+</FormTemplates>
+</file>
+
+<file path=customXml/item3.xml><?xml version="1.0" encoding="utf-8"?>
 <p:properties xmlns:p="http://schemas.microsoft.com/office/2006/metadata/properties" xmlns:xsi="http://www.w3.org/2001/XMLSchema-instance" xmlns:pc="http://schemas.microsoft.com/office/infopath/2007/PartnerControls">
   <documentManagement>
     <VSO_x0020_item_x0020_id xmlns="40262f94-9f35-4ac3-9a90-690165a166b7" xsi:nil="true"/>
@@ -12130,15 +12681,6 @@
     <Template_x0020_details xmlns="40262f94-9f35-4ac3-9a90-690165a166b7" xsi:nil="true"/>
   </documentManagement>
 </p:properties>
-</file>
-
-<file path=customXml/item3.xml><?xml version="1.0" encoding="utf-8"?>
-<?mso-contentType ?>
-<FormTemplates xmlns="http://schemas.microsoft.com/sharepoint/v3/contenttype/forms">
-  <Display>DocumentLibraryForm</Display>
-  <Edit>DocumentLibraryForm</Edit>
-  <New>DocumentLibraryForm</New>
-</FormTemplates>
 </file>
 
 <file path=customXml/itemProps1.xml><?xml version="1.0" encoding="utf-8"?>
@@ -12161,6 +12703,14 @@
 </file>
 
 <file path=customXml/itemProps2.xml><?xml version="1.0" encoding="utf-8"?>
+<ds:datastoreItem xmlns:ds="http://schemas.openxmlformats.org/officeDocument/2006/customXml" ds:itemID="{2E6DFB71-5650-4E53-8134-FCF33ECDD3D1}">
+  <ds:schemaRefs>
+    <ds:schemaRef ds:uri="http://schemas.microsoft.com/sharepoint/v3/contenttype/forms"/>
+  </ds:schemaRefs>
+</ds:datastoreItem>
+</file>
+
+<file path=customXml/itemProps3.xml><?xml version="1.0" encoding="utf-8"?>
 <ds:datastoreItem xmlns:ds="http://schemas.openxmlformats.org/officeDocument/2006/customXml" ds:itemID="{5630C5B9-1E5F-4356-968E-2FC64955BFF3}">
   <ds:schemaRefs>
     <ds:schemaRef ds:uri="http://purl.org/dc/elements/1.1/"/>
@@ -12175,12 +12725,4 @@
     <ds:schemaRef ds:uri="http://www.w3.org/XML/1998/namespace"/>
   </ds:schemaRefs>
 </ds:datastoreItem>
-</file>
-
-<file path=customXml/itemProps3.xml><?xml version="1.0" encoding="utf-8"?>
-<ds:datastoreItem xmlns:ds="http://schemas.openxmlformats.org/officeDocument/2006/customXml" ds:itemID="{2E6DFB71-5650-4E53-8134-FCF33ECDD3D1}">
-  <ds:schemaRefs>
-    <ds:schemaRef ds:uri="http://schemas.microsoft.com/sharepoint/v3/contenttype/forms"/>
-  </ds:schemaRefs>
-</ds:datastoreItem>
 </file>
</xml_diff>